<commit_message>
Updated documentation: System Diagram 1
</commit_message>
<xml_diff>
--- a/documentation/SystemView-1_HighLevel.pptx
+++ b/documentation/SystemView-1_HighLevel.pptx
@@ -104,6 +104,11 @@
       </a:defRPr>
     </a:lvl9pPr>
   </p:defaultTextStyle>
+  <p:extLst>
+    <p:ext uri="{EFAFB233-063F-42B5-8137-9DF3F51BA10A}">
+      <p15:sldGuideLst xmlns:p15="http://schemas.microsoft.com/office/powerpoint/2012/main"/>
+    </p:ext>
+  </p:extLst>
 </p:presentation>
 </file>
 
@@ -256,7 +261,7 @@
           <a:p>
             <a:fld id="{7E057EA0-3C9D-4A68-819A-8BC311FD86AE}" type="datetimeFigureOut">
               <a:rPr lang="de-DE" smtClean="0"/>
-              <a:t>24.05.2020</a:t>
+              <a:t>31.05.2020</a:t>
             </a:fld>
             <a:endParaRPr lang="de-DE"/>
           </a:p>
@@ -456,7 +461,7 @@
           <a:p>
             <a:fld id="{7E057EA0-3C9D-4A68-819A-8BC311FD86AE}" type="datetimeFigureOut">
               <a:rPr lang="de-DE" smtClean="0"/>
-              <a:t>24.05.2020</a:t>
+              <a:t>31.05.2020</a:t>
             </a:fld>
             <a:endParaRPr lang="de-DE"/>
           </a:p>
@@ -666,7 +671,7 @@
           <a:p>
             <a:fld id="{7E057EA0-3C9D-4A68-819A-8BC311FD86AE}" type="datetimeFigureOut">
               <a:rPr lang="de-DE" smtClean="0"/>
-              <a:t>24.05.2020</a:t>
+              <a:t>31.05.2020</a:t>
             </a:fld>
             <a:endParaRPr lang="de-DE"/>
           </a:p>
@@ -866,7 +871,7 @@
           <a:p>
             <a:fld id="{7E057EA0-3C9D-4A68-819A-8BC311FD86AE}" type="datetimeFigureOut">
               <a:rPr lang="de-DE" smtClean="0"/>
-              <a:t>24.05.2020</a:t>
+              <a:t>31.05.2020</a:t>
             </a:fld>
             <a:endParaRPr lang="de-DE"/>
           </a:p>
@@ -1142,7 +1147,7 @@
           <a:p>
             <a:fld id="{7E057EA0-3C9D-4A68-819A-8BC311FD86AE}" type="datetimeFigureOut">
               <a:rPr lang="de-DE" smtClean="0"/>
-              <a:t>24.05.2020</a:t>
+              <a:t>31.05.2020</a:t>
             </a:fld>
             <a:endParaRPr lang="de-DE"/>
           </a:p>
@@ -1410,7 +1415,7 @@
           <a:p>
             <a:fld id="{7E057EA0-3C9D-4A68-819A-8BC311FD86AE}" type="datetimeFigureOut">
               <a:rPr lang="de-DE" smtClean="0"/>
-              <a:t>24.05.2020</a:t>
+              <a:t>31.05.2020</a:t>
             </a:fld>
             <a:endParaRPr lang="de-DE"/>
           </a:p>
@@ -1825,7 +1830,7 @@
           <a:p>
             <a:fld id="{7E057EA0-3C9D-4A68-819A-8BC311FD86AE}" type="datetimeFigureOut">
               <a:rPr lang="de-DE" smtClean="0"/>
-              <a:t>24.05.2020</a:t>
+              <a:t>31.05.2020</a:t>
             </a:fld>
             <a:endParaRPr lang="de-DE"/>
           </a:p>
@@ -1967,7 +1972,7 @@
           <a:p>
             <a:fld id="{7E057EA0-3C9D-4A68-819A-8BC311FD86AE}" type="datetimeFigureOut">
               <a:rPr lang="de-DE" smtClean="0"/>
-              <a:t>24.05.2020</a:t>
+              <a:t>31.05.2020</a:t>
             </a:fld>
             <a:endParaRPr lang="de-DE"/>
           </a:p>
@@ -2080,7 +2085,7 @@
           <a:p>
             <a:fld id="{7E057EA0-3C9D-4A68-819A-8BC311FD86AE}" type="datetimeFigureOut">
               <a:rPr lang="de-DE" smtClean="0"/>
-              <a:t>24.05.2020</a:t>
+              <a:t>31.05.2020</a:t>
             </a:fld>
             <a:endParaRPr lang="de-DE"/>
           </a:p>
@@ -2393,7 +2398,7 @@
           <a:p>
             <a:fld id="{7E057EA0-3C9D-4A68-819A-8BC311FD86AE}" type="datetimeFigureOut">
               <a:rPr lang="de-DE" smtClean="0"/>
-              <a:t>24.05.2020</a:t>
+              <a:t>31.05.2020</a:t>
             </a:fld>
             <a:endParaRPr lang="de-DE"/>
           </a:p>
@@ -2682,7 +2687,7 @@
           <a:p>
             <a:fld id="{7E057EA0-3C9D-4A68-819A-8BC311FD86AE}" type="datetimeFigureOut">
               <a:rPr lang="de-DE" smtClean="0"/>
-              <a:t>24.05.2020</a:t>
+              <a:t>31.05.2020</a:t>
             </a:fld>
             <a:endParaRPr lang="de-DE"/>
           </a:p>
@@ -2925,7 +2930,7 @@
           <a:p>
             <a:fld id="{7E057EA0-3C9D-4A68-819A-8BC311FD86AE}" type="datetimeFigureOut">
               <a:rPr lang="de-DE" smtClean="0"/>
-              <a:t>24.05.2020</a:t>
+              <a:t>31.05.2020</a:t>
             </a:fld>
             <a:endParaRPr lang="de-DE"/>
           </a:p>
@@ -3344,10 +3349,10 @@
       </p:grpSpPr>
       <p:sp>
         <p:nvSpPr>
-          <p:cNvPr id="4" name="Rectangle: Rounded Corners 3">
-            <a:extLst>
-              <a:ext uri="{FF2B5EF4-FFF2-40B4-BE49-F238E27FC236}">
-                <a16:creationId xmlns:a16="http://schemas.microsoft.com/office/drawing/2014/main" id="{DE605C44-C0E6-4B28-AC51-5D5B34839FAF}"/>
+          <p:cNvPr id="6" name="Rectangle 5">
+            <a:extLst>
+              <a:ext uri="{FF2B5EF4-FFF2-40B4-BE49-F238E27FC236}">
+                <a16:creationId xmlns:a16="http://schemas.microsoft.com/office/drawing/2014/main" id="{40304F91-14EF-4986-A82B-43DAB106FEBB}"/>
               </a:ext>
             </a:extLst>
           </p:cNvPr>
@@ -3356,28 +3361,316 @@
         </p:nvSpPr>
         <p:spPr>
           <a:xfrm>
-            <a:off x="7895111" y="1566771"/>
-            <a:ext cx="3657600" cy="1554772"/>
-          </a:xfrm>
-          <a:prstGeom prst="roundRect">
-            <a:avLst>
-              <a:gd name="adj" fmla="val 50000"/>
-            </a:avLst>
-          </a:prstGeom>
-          <a:noFill/>
+            <a:off x="7895111" y="2230691"/>
+            <a:ext cx="3642026" cy="878814"/>
+          </a:xfrm>
+          <a:custGeom>
+            <a:avLst/>
+            <a:gdLst>
+              <a:gd name="connsiteX0" fmla="*/ 0 w 3642026"/>
+              <a:gd name="connsiteY0" fmla="*/ 0 h 878814"/>
+              <a:gd name="connsiteX1" fmla="*/ 570584 w 3642026"/>
+              <a:gd name="connsiteY1" fmla="*/ 0 h 878814"/>
+              <a:gd name="connsiteX2" fmla="*/ 1068328 w 3642026"/>
+              <a:gd name="connsiteY2" fmla="*/ 0 h 878814"/>
+              <a:gd name="connsiteX3" fmla="*/ 1602491 w 3642026"/>
+              <a:gd name="connsiteY3" fmla="*/ 0 h 878814"/>
+              <a:gd name="connsiteX4" fmla="*/ 2245916 w 3642026"/>
+              <a:gd name="connsiteY4" fmla="*/ 0 h 878814"/>
+              <a:gd name="connsiteX5" fmla="*/ 2816500 w 3642026"/>
+              <a:gd name="connsiteY5" fmla="*/ 0 h 878814"/>
+              <a:gd name="connsiteX6" fmla="*/ 3642026 w 3642026"/>
+              <a:gd name="connsiteY6" fmla="*/ 0 h 878814"/>
+              <a:gd name="connsiteX7" fmla="*/ 3642026 w 3642026"/>
+              <a:gd name="connsiteY7" fmla="*/ 448195 h 878814"/>
+              <a:gd name="connsiteX8" fmla="*/ 3642026 w 3642026"/>
+              <a:gd name="connsiteY8" fmla="*/ 878814 h 878814"/>
+              <a:gd name="connsiteX9" fmla="*/ 3035022 w 3642026"/>
+              <a:gd name="connsiteY9" fmla="*/ 878814 h 878814"/>
+              <a:gd name="connsiteX10" fmla="*/ 2500858 w 3642026"/>
+              <a:gd name="connsiteY10" fmla="*/ 878814 h 878814"/>
+              <a:gd name="connsiteX11" fmla="*/ 1821013 w 3642026"/>
+              <a:gd name="connsiteY11" fmla="*/ 878814 h 878814"/>
+              <a:gd name="connsiteX12" fmla="*/ 1250429 w 3642026"/>
+              <a:gd name="connsiteY12" fmla="*/ 878814 h 878814"/>
+              <a:gd name="connsiteX13" fmla="*/ 752685 w 3642026"/>
+              <a:gd name="connsiteY13" fmla="*/ 878814 h 878814"/>
+              <a:gd name="connsiteX14" fmla="*/ 0 w 3642026"/>
+              <a:gd name="connsiteY14" fmla="*/ 878814 h 878814"/>
+              <a:gd name="connsiteX15" fmla="*/ 0 w 3642026"/>
+              <a:gd name="connsiteY15" fmla="*/ 456983 h 878814"/>
+              <a:gd name="connsiteX16" fmla="*/ 0 w 3642026"/>
+              <a:gd name="connsiteY16" fmla="*/ 0 h 878814"/>
+            </a:gdLst>
+            <a:ahLst/>
+            <a:cxnLst>
+              <a:cxn ang="0">
+                <a:pos x="connsiteX0" y="connsiteY0"/>
+              </a:cxn>
+              <a:cxn ang="0">
+                <a:pos x="connsiteX1" y="connsiteY1"/>
+              </a:cxn>
+              <a:cxn ang="0">
+                <a:pos x="connsiteX2" y="connsiteY2"/>
+              </a:cxn>
+              <a:cxn ang="0">
+                <a:pos x="connsiteX3" y="connsiteY3"/>
+              </a:cxn>
+              <a:cxn ang="0">
+                <a:pos x="connsiteX4" y="connsiteY4"/>
+              </a:cxn>
+              <a:cxn ang="0">
+                <a:pos x="connsiteX5" y="connsiteY5"/>
+              </a:cxn>
+              <a:cxn ang="0">
+                <a:pos x="connsiteX6" y="connsiteY6"/>
+              </a:cxn>
+              <a:cxn ang="0">
+                <a:pos x="connsiteX7" y="connsiteY7"/>
+              </a:cxn>
+              <a:cxn ang="0">
+                <a:pos x="connsiteX8" y="connsiteY8"/>
+              </a:cxn>
+              <a:cxn ang="0">
+                <a:pos x="connsiteX9" y="connsiteY9"/>
+              </a:cxn>
+              <a:cxn ang="0">
+                <a:pos x="connsiteX10" y="connsiteY10"/>
+              </a:cxn>
+              <a:cxn ang="0">
+                <a:pos x="connsiteX11" y="connsiteY11"/>
+              </a:cxn>
+              <a:cxn ang="0">
+                <a:pos x="connsiteX12" y="connsiteY12"/>
+              </a:cxn>
+              <a:cxn ang="0">
+                <a:pos x="connsiteX13" y="connsiteY13"/>
+              </a:cxn>
+              <a:cxn ang="0">
+                <a:pos x="connsiteX14" y="connsiteY14"/>
+              </a:cxn>
+              <a:cxn ang="0">
+                <a:pos x="connsiteX15" y="connsiteY15"/>
+              </a:cxn>
+              <a:cxn ang="0">
+                <a:pos x="connsiteX16" y="connsiteY16"/>
+              </a:cxn>
+            </a:cxnLst>
+            <a:rect l="l" t="t" r="r" b="b"/>
+            <a:pathLst>
+              <a:path w="3642026" h="878814" fill="none" extrusionOk="0">
+                <a:moveTo>
+                  <a:pt x="0" y="0"/>
+                </a:moveTo>
+                <a:cubicBezTo>
+                  <a:pt x="201427" y="-10756"/>
+                  <a:pt x="410235" y="15933"/>
+                  <a:pt x="570584" y="0"/>
+                </a:cubicBezTo>
+                <a:cubicBezTo>
+                  <a:pt x="730933" y="-15933"/>
+                  <a:pt x="893424" y="-21688"/>
+                  <a:pt x="1068328" y="0"/>
+                </a:cubicBezTo>
+                <a:cubicBezTo>
+                  <a:pt x="1243232" y="21688"/>
+                  <a:pt x="1443667" y="23393"/>
+                  <a:pt x="1602491" y="0"/>
+                </a:cubicBezTo>
+                <a:cubicBezTo>
+                  <a:pt x="1761315" y="-23393"/>
+                  <a:pt x="2014919" y="-23039"/>
+                  <a:pt x="2245916" y="0"/>
+                </a:cubicBezTo>
+                <a:cubicBezTo>
+                  <a:pt x="2476914" y="23039"/>
+                  <a:pt x="2691895" y="9073"/>
+                  <a:pt x="2816500" y="0"/>
+                </a:cubicBezTo>
+                <a:cubicBezTo>
+                  <a:pt x="2941105" y="-9073"/>
+                  <a:pt x="3276152" y="-41205"/>
+                  <a:pt x="3642026" y="0"/>
+                </a:cubicBezTo>
+                <a:cubicBezTo>
+                  <a:pt x="3644764" y="119778"/>
+                  <a:pt x="3646527" y="335767"/>
+                  <a:pt x="3642026" y="448195"/>
+                </a:cubicBezTo>
+                <a:cubicBezTo>
+                  <a:pt x="3637525" y="560624"/>
+                  <a:pt x="3655691" y="685203"/>
+                  <a:pt x="3642026" y="878814"/>
+                </a:cubicBezTo>
+                <a:cubicBezTo>
+                  <a:pt x="3398001" y="860855"/>
+                  <a:pt x="3244076" y="866678"/>
+                  <a:pt x="3035022" y="878814"/>
+                </a:cubicBezTo>
+                <a:cubicBezTo>
+                  <a:pt x="2825968" y="890950"/>
+                  <a:pt x="2675414" y="860413"/>
+                  <a:pt x="2500858" y="878814"/>
+                </a:cubicBezTo>
+                <a:cubicBezTo>
+                  <a:pt x="2326302" y="897215"/>
+                  <a:pt x="2003010" y="860451"/>
+                  <a:pt x="1821013" y="878814"/>
+                </a:cubicBezTo>
+                <a:cubicBezTo>
+                  <a:pt x="1639017" y="897177"/>
+                  <a:pt x="1388207" y="885059"/>
+                  <a:pt x="1250429" y="878814"/>
+                </a:cubicBezTo>
+                <a:cubicBezTo>
+                  <a:pt x="1112651" y="872569"/>
+                  <a:pt x="997241" y="900050"/>
+                  <a:pt x="752685" y="878814"/>
+                </a:cubicBezTo>
+                <a:cubicBezTo>
+                  <a:pt x="508129" y="857578"/>
+                  <a:pt x="213969" y="897117"/>
+                  <a:pt x="0" y="878814"/>
+                </a:cubicBezTo>
+                <a:cubicBezTo>
+                  <a:pt x="-14701" y="785268"/>
+                  <a:pt x="-14649" y="543284"/>
+                  <a:pt x="0" y="456983"/>
+                </a:cubicBezTo>
+                <a:cubicBezTo>
+                  <a:pt x="14649" y="370682"/>
+                  <a:pt x="-22396" y="155688"/>
+                  <a:pt x="0" y="0"/>
+                </a:cubicBezTo>
+                <a:close/>
+              </a:path>
+              <a:path w="3642026" h="878814" stroke="0" extrusionOk="0">
+                <a:moveTo>
+                  <a:pt x="0" y="0"/>
+                </a:moveTo>
+                <a:cubicBezTo>
+                  <a:pt x="159440" y="1047"/>
+                  <a:pt x="331509" y="-7580"/>
+                  <a:pt x="570584" y="0"/>
+                </a:cubicBezTo>
+                <a:cubicBezTo>
+                  <a:pt x="809659" y="7580"/>
+                  <a:pt x="918772" y="11592"/>
+                  <a:pt x="1068328" y="0"/>
+                </a:cubicBezTo>
+                <a:cubicBezTo>
+                  <a:pt x="1217884" y="-11592"/>
+                  <a:pt x="1447379" y="-10554"/>
+                  <a:pt x="1748172" y="0"/>
+                </a:cubicBezTo>
+                <a:cubicBezTo>
+                  <a:pt x="2048965" y="10554"/>
+                  <a:pt x="2059160" y="-8656"/>
+                  <a:pt x="2318757" y="0"/>
+                </a:cubicBezTo>
+                <a:cubicBezTo>
+                  <a:pt x="2578354" y="8656"/>
+                  <a:pt x="2744360" y="-3041"/>
+                  <a:pt x="2889341" y="0"/>
+                </a:cubicBezTo>
+                <a:cubicBezTo>
+                  <a:pt x="3034322" y="3041"/>
+                  <a:pt x="3330869" y="24518"/>
+                  <a:pt x="3642026" y="0"/>
+                </a:cubicBezTo>
+                <a:cubicBezTo>
+                  <a:pt x="3661527" y="108060"/>
+                  <a:pt x="3654404" y="223042"/>
+                  <a:pt x="3642026" y="421831"/>
+                </a:cubicBezTo>
+                <a:cubicBezTo>
+                  <a:pt x="3629648" y="620620"/>
+                  <a:pt x="3636292" y="725363"/>
+                  <a:pt x="3642026" y="878814"/>
+                </a:cubicBezTo>
+                <a:cubicBezTo>
+                  <a:pt x="3418943" y="855209"/>
+                  <a:pt x="3263341" y="879831"/>
+                  <a:pt x="3107862" y="878814"/>
+                </a:cubicBezTo>
+                <a:cubicBezTo>
+                  <a:pt x="2952383" y="877797"/>
+                  <a:pt x="2686304" y="875126"/>
+                  <a:pt x="2500858" y="878814"/>
+                </a:cubicBezTo>
+                <a:cubicBezTo>
+                  <a:pt x="2315412" y="882502"/>
+                  <a:pt x="2122711" y="893089"/>
+                  <a:pt x="1893854" y="878814"/>
+                </a:cubicBezTo>
+                <a:cubicBezTo>
+                  <a:pt x="1664997" y="864539"/>
+                  <a:pt x="1546311" y="903450"/>
+                  <a:pt x="1323269" y="878814"/>
+                </a:cubicBezTo>
+                <a:cubicBezTo>
+                  <a:pt x="1100228" y="854178"/>
+                  <a:pt x="803431" y="881459"/>
+                  <a:pt x="643425" y="878814"/>
+                </a:cubicBezTo>
+                <a:cubicBezTo>
+                  <a:pt x="483419" y="876169"/>
+                  <a:pt x="190077" y="852789"/>
+                  <a:pt x="0" y="878814"/>
+                </a:cubicBezTo>
+                <a:cubicBezTo>
+                  <a:pt x="-8942" y="694446"/>
+                  <a:pt x="-4788" y="549850"/>
+                  <a:pt x="0" y="456983"/>
+                </a:cubicBezTo>
+                <a:cubicBezTo>
+                  <a:pt x="4788" y="364116"/>
+                  <a:pt x="7543" y="214689"/>
+                  <a:pt x="0" y="0"/>
+                </a:cubicBezTo>
+                <a:close/>
+              </a:path>
+            </a:pathLst>
+          </a:custGeom>
+          <a:solidFill>
+            <a:schemeClr val="accent1">
+              <a:lumMod val="20000"/>
+              <a:lumOff val="80000"/>
+              <a:alpha val="70000"/>
+            </a:schemeClr>
+          </a:solidFill>
+          <a:ln>
+            <a:solidFill>
+              <a:schemeClr val="accent1"/>
+            </a:solidFill>
+            <a:extLst>
+              <a:ext uri="{C807C97D-BFC1-408E-A445-0C87EB9F89A2}">
+                <ask:lineSketchStyleProps xmlns:ask="http://schemas.microsoft.com/office/drawing/2018/sketchyshapes" sd="1219033472">
+                  <a:prstGeom prst="rect">
+                    <a:avLst/>
+                  </a:prstGeom>
+                  <ask:type>
+                    <ask:lineSketchFreehand/>
+                  </ask:type>
+                </ask:lineSketchStyleProps>
+              </a:ext>
+            </a:extLst>
+          </a:ln>
         </p:spPr>
         <p:style>
           <a:lnRef idx="2">
-            <a:schemeClr val="dk1"/>
+            <a:schemeClr val="accent1">
+              <a:shade val="50000"/>
+            </a:schemeClr>
           </a:lnRef>
           <a:fillRef idx="1">
-            <a:schemeClr val="lt1"/>
+            <a:schemeClr val="accent1"/>
           </a:fillRef>
           <a:effectRef idx="0">
-            <a:schemeClr val="dk1"/>
+            <a:schemeClr val="accent1"/>
           </a:effectRef>
           <a:fontRef idx="minor">
-            <a:schemeClr val="dk1"/>
+            <a:schemeClr val="lt1"/>
           </a:fontRef>
         </p:style>
         <p:txBody>
@@ -3391,10 +3684,10 @@
       </p:sp>
       <p:sp>
         <p:nvSpPr>
-          <p:cNvPr id="7" name="Rectangle 6">
-            <a:extLst>
-              <a:ext uri="{FF2B5EF4-FFF2-40B4-BE49-F238E27FC236}">
-                <a16:creationId xmlns:a16="http://schemas.microsoft.com/office/drawing/2014/main" id="{DABC19B8-3255-4D30-B07B-3CFEBF951B93}"/>
+          <p:cNvPr id="3" name="Oval 2">
+            <a:extLst>
+              <a:ext uri="{FF2B5EF4-FFF2-40B4-BE49-F238E27FC236}">
+                <a16:creationId xmlns:a16="http://schemas.microsoft.com/office/drawing/2014/main" id="{F839C32B-ED60-4CF7-B05C-2E00C6E41CF8}"/>
               </a:ext>
             </a:extLst>
           </p:cNvPr>
@@ -3403,10 +3696,10 @@
         </p:nvSpPr>
         <p:spPr>
           <a:xfrm>
-            <a:off x="10444406" y="1508664"/>
-            <a:ext cx="367095" cy="116214"/>
-          </a:xfrm>
-          <a:prstGeom prst="rect">
+            <a:off x="7817148" y="3045975"/>
+            <a:ext cx="171405" cy="124737"/>
+          </a:xfrm>
+          <a:prstGeom prst="ellipse">
             <a:avLst/>
           </a:prstGeom>
           <a:solidFill>
@@ -3443,10 +3736,10 @@
       </p:sp>
       <p:sp>
         <p:nvSpPr>
-          <p:cNvPr id="9" name="Rectangle 8">
-            <a:extLst>
-              <a:ext uri="{FF2B5EF4-FFF2-40B4-BE49-F238E27FC236}">
-                <a16:creationId xmlns:a16="http://schemas.microsoft.com/office/drawing/2014/main" id="{99A9636F-32D8-4A07-8B15-551CC10FC470}"/>
+          <p:cNvPr id="79" name="Oval 78">
+            <a:extLst>
+              <a:ext uri="{FF2B5EF4-FFF2-40B4-BE49-F238E27FC236}">
+                <a16:creationId xmlns:a16="http://schemas.microsoft.com/office/drawing/2014/main" id="{0A871F04-E870-4A1F-ADA4-5FA8CFDFEB86}"/>
               </a:ext>
             </a:extLst>
           </p:cNvPr>
@@ -3455,62 +3748,10 @@
         </p:nvSpPr>
         <p:spPr>
           <a:xfrm>
-            <a:off x="7151657" y="2949234"/>
-            <a:ext cx="1203991" cy="124737"/>
-          </a:xfrm>
-          <a:prstGeom prst="rect">
-            <a:avLst/>
-          </a:prstGeom>
-          <a:noFill/>
-          <a:ln>
-            <a:solidFill>
-              <a:schemeClr val="tx1"/>
-            </a:solidFill>
-          </a:ln>
-        </p:spPr>
-        <p:style>
-          <a:lnRef idx="2">
-            <a:schemeClr val="accent1">
-              <a:shade val="50000"/>
-            </a:schemeClr>
-          </a:lnRef>
-          <a:fillRef idx="1">
-            <a:schemeClr val="accent1"/>
-          </a:fillRef>
-          <a:effectRef idx="0">
-            <a:schemeClr val="accent1"/>
-          </a:effectRef>
-          <a:fontRef idx="minor">
-            <a:schemeClr val="lt1"/>
-          </a:fontRef>
-        </p:style>
-        <p:txBody>
-          <a:bodyPr rtlCol="0" anchor="ctr"/>
-          <a:lstStyle/>
-          <a:p>
-            <a:pPr algn="ctr"/>
-            <a:endParaRPr lang="de-DE"/>
-          </a:p>
-        </p:txBody>
-      </p:sp>
-      <p:sp>
-        <p:nvSpPr>
-          <p:cNvPr id="8" name="Rectangle 7">
-            <a:extLst>
-              <a:ext uri="{FF2B5EF4-FFF2-40B4-BE49-F238E27FC236}">
-                <a16:creationId xmlns:a16="http://schemas.microsoft.com/office/drawing/2014/main" id="{B260F1A9-CA37-4FA6-98E1-62EDDE5026DD}"/>
-              </a:ext>
-            </a:extLst>
-          </p:cNvPr>
-          <p:cNvSpPr/>
-          <p:nvPr/>
-        </p:nvSpPr>
-        <p:spPr>
-          <a:xfrm>
-            <a:off x="7988553" y="2958338"/>
-            <a:ext cx="367095" cy="107045"/>
-          </a:xfrm>
-          <a:prstGeom prst="rect">
+            <a:off x="11450852" y="3019581"/>
+            <a:ext cx="171405" cy="124737"/>
+          </a:xfrm>
+          <a:prstGeom prst="ellipse">
             <a:avLst/>
           </a:prstGeom>
           <a:solidFill>
@@ -3547,10 +3788,10 @@
       </p:sp>
       <p:sp>
         <p:nvSpPr>
-          <p:cNvPr id="10" name="Rectangle 9">
-            <a:extLst>
-              <a:ext uri="{FF2B5EF4-FFF2-40B4-BE49-F238E27FC236}">
-                <a16:creationId xmlns:a16="http://schemas.microsoft.com/office/drawing/2014/main" id="{56B25D36-281C-4A33-BFE0-AE494F632ED2}"/>
+          <p:cNvPr id="4" name="Rectangle: Rounded Corners 3">
+            <a:extLst>
+              <a:ext uri="{FF2B5EF4-FFF2-40B4-BE49-F238E27FC236}">
+                <a16:creationId xmlns:a16="http://schemas.microsoft.com/office/drawing/2014/main" id="{DE605C44-C0E6-4B28-AC51-5D5B34839FAF}"/>
               </a:ext>
             </a:extLst>
           </p:cNvPr>
@@ -3559,10 +3800,57 @@
         </p:nvSpPr>
         <p:spPr>
           <a:xfrm>
-            <a:off x="7157319" y="2947591"/>
-            <a:ext cx="108537" cy="106372"/>
-          </a:xfrm>
-          <a:prstGeom prst="rect">
+            <a:off x="7895111" y="1566771"/>
+            <a:ext cx="3657600" cy="1554772"/>
+          </a:xfrm>
+          <a:prstGeom prst="roundRect">
+            <a:avLst>
+              <a:gd name="adj" fmla="val 50000"/>
+            </a:avLst>
+          </a:prstGeom>
+          <a:noFill/>
+        </p:spPr>
+        <p:style>
+          <a:lnRef idx="2">
+            <a:schemeClr val="dk1"/>
+          </a:lnRef>
+          <a:fillRef idx="1">
+            <a:schemeClr val="lt1"/>
+          </a:fillRef>
+          <a:effectRef idx="0">
+            <a:schemeClr val="dk1"/>
+          </a:effectRef>
+          <a:fontRef idx="minor">
+            <a:schemeClr val="dk1"/>
+          </a:fontRef>
+        </p:style>
+        <p:txBody>
+          <a:bodyPr rtlCol="0" anchor="ctr"/>
+          <a:lstStyle/>
+          <a:p>
+            <a:pPr algn="ctr"/>
+            <a:endParaRPr lang="de-DE"/>
+          </a:p>
+        </p:txBody>
+      </p:sp>
+      <p:sp>
+        <p:nvSpPr>
+          <p:cNvPr id="2" name="Moon 1">
+            <a:extLst>
+              <a:ext uri="{FF2B5EF4-FFF2-40B4-BE49-F238E27FC236}">
+                <a16:creationId xmlns:a16="http://schemas.microsoft.com/office/drawing/2014/main" id="{371122CC-5AF2-4E3C-9E86-7759B0326C71}"/>
+              </a:ext>
+            </a:extLst>
+          </p:cNvPr>
+          <p:cNvSpPr/>
+          <p:nvPr/>
+        </p:nvSpPr>
+        <p:spPr>
+          <a:xfrm rot="18664552">
+            <a:off x="7872089" y="2330968"/>
+            <a:ext cx="576079" cy="1214411"/>
+          </a:xfrm>
+          <a:prstGeom prst="moon">
             <a:avLst/>
           </a:prstGeom>
           <a:solidFill>
@@ -3597,189 +3885,12 @@
           </a:p>
         </p:txBody>
       </p:sp>
-      <p:grpSp>
-        <p:nvGrpSpPr>
-          <p:cNvPr id="14" name="Group 13">
-            <a:extLst>
-              <a:ext uri="{FF2B5EF4-FFF2-40B4-BE49-F238E27FC236}">
-                <a16:creationId xmlns:a16="http://schemas.microsoft.com/office/drawing/2014/main" id="{EB99BE16-E56F-438D-A9A4-A82D9D8418D9}"/>
-              </a:ext>
-            </a:extLst>
-          </p:cNvPr>
-          <p:cNvGrpSpPr/>
-          <p:nvPr/>
-        </p:nvGrpSpPr>
-        <p:grpSpPr>
-          <a:xfrm rot="5400000">
-            <a:off x="5866941" y="1638081"/>
-            <a:ext cx="2689846" cy="141916"/>
-            <a:chOff x="6234267" y="2482562"/>
-            <a:chExt cx="1201124" cy="149688"/>
-          </a:xfrm>
-        </p:grpSpPr>
-        <p:sp>
-          <p:nvSpPr>
-            <p:cNvPr id="11" name="Rectangle 10">
-              <a:extLst>
-                <a:ext uri="{FF2B5EF4-FFF2-40B4-BE49-F238E27FC236}">
-                  <a16:creationId xmlns:a16="http://schemas.microsoft.com/office/drawing/2014/main" id="{3CB0D92A-6F6B-4F74-900E-4232F8133D8F}"/>
-                </a:ext>
-              </a:extLst>
-            </p:cNvPr>
-            <p:cNvSpPr/>
-            <p:nvPr/>
-          </p:nvSpPr>
-          <p:spPr>
-            <a:xfrm>
-              <a:off x="6257127" y="2500464"/>
-              <a:ext cx="1143902" cy="120459"/>
-            </a:xfrm>
-            <a:prstGeom prst="rect">
-              <a:avLst/>
-            </a:prstGeom>
-            <a:noFill/>
-            <a:ln>
-              <a:solidFill>
-                <a:schemeClr val="tx1"/>
-              </a:solidFill>
-            </a:ln>
-          </p:spPr>
-          <p:style>
-            <a:lnRef idx="2">
-              <a:schemeClr val="accent1">
-                <a:shade val="50000"/>
-              </a:schemeClr>
-            </a:lnRef>
-            <a:fillRef idx="1">
-              <a:schemeClr val="accent1"/>
-            </a:fillRef>
-            <a:effectRef idx="0">
-              <a:schemeClr val="accent1"/>
-            </a:effectRef>
-            <a:fontRef idx="minor">
-              <a:schemeClr val="lt1"/>
-            </a:fontRef>
-          </p:style>
-          <p:txBody>
-            <a:bodyPr rtlCol="0" anchor="ctr"/>
-            <a:lstStyle/>
-            <a:p>
-              <a:pPr algn="ctr"/>
-              <a:endParaRPr lang="de-DE"/>
-            </a:p>
-          </p:txBody>
-        </p:sp>
-        <p:sp>
-          <p:nvSpPr>
-            <p:cNvPr id="12" name="Rectangle 11">
-              <a:extLst>
-                <a:ext uri="{FF2B5EF4-FFF2-40B4-BE49-F238E27FC236}">
-                  <a16:creationId xmlns:a16="http://schemas.microsoft.com/office/drawing/2014/main" id="{1823C8F4-7729-43BC-A802-F0A97BE38017}"/>
-                </a:ext>
-              </a:extLst>
-            </p:cNvPr>
-            <p:cNvSpPr/>
-            <p:nvPr/>
-          </p:nvSpPr>
-          <p:spPr>
-            <a:xfrm>
-              <a:off x="6234267" y="2482562"/>
-              <a:ext cx="45719" cy="149688"/>
-            </a:xfrm>
-            <a:prstGeom prst="rect">
-              <a:avLst/>
-            </a:prstGeom>
-            <a:solidFill>
-              <a:schemeClr val="bg1"/>
-            </a:solidFill>
-            <a:ln>
-              <a:noFill/>
-            </a:ln>
-          </p:spPr>
-          <p:style>
-            <a:lnRef idx="2">
-              <a:schemeClr val="accent1">
-                <a:shade val="50000"/>
-              </a:schemeClr>
-            </a:lnRef>
-            <a:fillRef idx="1">
-              <a:schemeClr val="accent1"/>
-            </a:fillRef>
-            <a:effectRef idx="0">
-              <a:schemeClr val="accent1"/>
-            </a:effectRef>
-            <a:fontRef idx="minor">
-              <a:schemeClr val="lt1"/>
-            </a:fontRef>
-          </p:style>
-          <p:txBody>
-            <a:bodyPr rtlCol="0" anchor="ctr"/>
-            <a:lstStyle/>
-            <a:p>
-              <a:pPr algn="ctr"/>
-              <a:endParaRPr lang="de-DE"/>
-            </a:p>
-          </p:txBody>
-        </p:sp>
-        <p:sp>
-          <p:nvSpPr>
-            <p:cNvPr id="13" name="Rectangle 12">
-              <a:extLst>
-                <a:ext uri="{FF2B5EF4-FFF2-40B4-BE49-F238E27FC236}">
-                  <a16:creationId xmlns:a16="http://schemas.microsoft.com/office/drawing/2014/main" id="{D02804D2-77BA-4644-9689-4165963A073E}"/>
-                </a:ext>
-              </a:extLst>
-            </p:cNvPr>
-            <p:cNvSpPr/>
-            <p:nvPr/>
-          </p:nvSpPr>
-          <p:spPr>
-            <a:xfrm>
-              <a:off x="7384135" y="2506181"/>
-              <a:ext cx="51256" cy="108768"/>
-            </a:xfrm>
-            <a:prstGeom prst="rect">
-              <a:avLst/>
-            </a:prstGeom>
-            <a:solidFill>
-              <a:schemeClr val="bg1"/>
-            </a:solidFill>
-            <a:ln>
-              <a:noFill/>
-            </a:ln>
-          </p:spPr>
-          <p:style>
-            <a:lnRef idx="2">
-              <a:schemeClr val="accent1">
-                <a:shade val="50000"/>
-              </a:schemeClr>
-            </a:lnRef>
-            <a:fillRef idx="1">
-              <a:schemeClr val="accent1"/>
-            </a:fillRef>
-            <a:effectRef idx="0">
-              <a:schemeClr val="accent1"/>
-            </a:effectRef>
-            <a:fontRef idx="minor">
-              <a:schemeClr val="lt1"/>
-            </a:fontRef>
-          </p:style>
-          <p:txBody>
-            <a:bodyPr rtlCol="0" anchor="ctr"/>
-            <a:lstStyle/>
-            <a:p>
-              <a:pPr algn="ctr"/>
-              <a:endParaRPr lang="de-DE"/>
-            </a:p>
-          </p:txBody>
-        </p:sp>
-      </p:grpSp>
       <p:sp>
         <p:nvSpPr>
-          <p:cNvPr id="6" name="Rectangle 5">
-            <a:extLst>
-              <a:ext uri="{FF2B5EF4-FFF2-40B4-BE49-F238E27FC236}">
-                <a16:creationId xmlns:a16="http://schemas.microsoft.com/office/drawing/2014/main" id="{40304F91-14EF-4986-A82B-43DAB106FEBB}"/>
+          <p:cNvPr id="7" name="Rectangle 6">
+            <a:extLst>
+              <a:ext uri="{FF2B5EF4-FFF2-40B4-BE49-F238E27FC236}">
+                <a16:creationId xmlns:a16="http://schemas.microsoft.com/office/drawing/2014/main" id="{DABC19B8-3255-4D30-B07B-3CFEBF951B93}"/>
               </a:ext>
             </a:extLst>
           </p:cNvPr>
@@ -3788,300 +3899,17 @@
         </p:nvSpPr>
         <p:spPr>
           <a:xfrm>
-            <a:off x="7895111" y="2230691"/>
-            <a:ext cx="3642026" cy="890852"/>
-          </a:xfrm>
-          <a:custGeom>
+            <a:off x="10444406" y="1508664"/>
+            <a:ext cx="367095" cy="116214"/>
+          </a:xfrm>
+          <a:prstGeom prst="rect">
             <a:avLst/>
-            <a:gdLst>
-              <a:gd name="connsiteX0" fmla="*/ 0 w 3642026"/>
-              <a:gd name="connsiteY0" fmla="*/ 0 h 890852"/>
-              <a:gd name="connsiteX1" fmla="*/ 570584 w 3642026"/>
-              <a:gd name="connsiteY1" fmla="*/ 0 h 890852"/>
-              <a:gd name="connsiteX2" fmla="*/ 1068328 w 3642026"/>
-              <a:gd name="connsiteY2" fmla="*/ 0 h 890852"/>
-              <a:gd name="connsiteX3" fmla="*/ 1602491 w 3642026"/>
-              <a:gd name="connsiteY3" fmla="*/ 0 h 890852"/>
-              <a:gd name="connsiteX4" fmla="*/ 2245916 w 3642026"/>
-              <a:gd name="connsiteY4" fmla="*/ 0 h 890852"/>
-              <a:gd name="connsiteX5" fmla="*/ 2816500 w 3642026"/>
-              <a:gd name="connsiteY5" fmla="*/ 0 h 890852"/>
-              <a:gd name="connsiteX6" fmla="*/ 3642026 w 3642026"/>
-              <a:gd name="connsiteY6" fmla="*/ 0 h 890852"/>
-              <a:gd name="connsiteX7" fmla="*/ 3642026 w 3642026"/>
-              <a:gd name="connsiteY7" fmla="*/ 454335 h 890852"/>
-              <a:gd name="connsiteX8" fmla="*/ 3642026 w 3642026"/>
-              <a:gd name="connsiteY8" fmla="*/ 890852 h 890852"/>
-              <a:gd name="connsiteX9" fmla="*/ 3035022 w 3642026"/>
-              <a:gd name="connsiteY9" fmla="*/ 890852 h 890852"/>
-              <a:gd name="connsiteX10" fmla="*/ 2500858 w 3642026"/>
-              <a:gd name="connsiteY10" fmla="*/ 890852 h 890852"/>
-              <a:gd name="connsiteX11" fmla="*/ 1821013 w 3642026"/>
-              <a:gd name="connsiteY11" fmla="*/ 890852 h 890852"/>
-              <a:gd name="connsiteX12" fmla="*/ 1250429 w 3642026"/>
-              <a:gd name="connsiteY12" fmla="*/ 890852 h 890852"/>
-              <a:gd name="connsiteX13" fmla="*/ 752685 w 3642026"/>
-              <a:gd name="connsiteY13" fmla="*/ 890852 h 890852"/>
-              <a:gd name="connsiteX14" fmla="*/ 0 w 3642026"/>
-              <a:gd name="connsiteY14" fmla="*/ 890852 h 890852"/>
-              <a:gd name="connsiteX15" fmla="*/ 0 w 3642026"/>
-              <a:gd name="connsiteY15" fmla="*/ 463243 h 890852"/>
-              <a:gd name="connsiteX16" fmla="*/ 0 w 3642026"/>
-              <a:gd name="connsiteY16" fmla="*/ 0 h 890852"/>
-            </a:gdLst>
-            <a:ahLst/>
-            <a:cxnLst>
-              <a:cxn ang="0">
-                <a:pos x="connsiteX0" y="connsiteY0"/>
-              </a:cxn>
-              <a:cxn ang="0">
-                <a:pos x="connsiteX1" y="connsiteY1"/>
-              </a:cxn>
-              <a:cxn ang="0">
-                <a:pos x="connsiteX2" y="connsiteY2"/>
-              </a:cxn>
-              <a:cxn ang="0">
-                <a:pos x="connsiteX3" y="connsiteY3"/>
-              </a:cxn>
-              <a:cxn ang="0">
-                <a:pos x="connsiteX4" y="connsiteY4"/>
-              </a:cxn>
-              <a:cxn ang="0">
-                <a:pos x="connsiteX5" y="connsiteY5"/>
-              </a:cxn>
-              <a:cxn ang="0">
-                <a:pos x="connsiteX6" y="connsiteY6"/>
-              </a:cxn>
-              <a:cxn ang="0">
-                <a:pos x="connsiteX7" y="connsiteY7"/>
-              </a:cxn>
-              <a:cxn ang="0">
-                <a:pos x="connsiteX8" y="connsiteY8"/>
-              </a:cxn>
-              <a:cxn ang="0">
-                <a:pos x="connsiteX9" y="connsiteY9"/>
-              </a:cxn>
-              <a:cxn ang="0">
-                <a:pos x="connsiteX10" y="connsiteY10"/>
-              </a:cxn>
-              <a:cxn ang="0">
-                <a:pos x="connsiteX11" y="connsiteY11"/>
-              </a:cxn>
-              <a:cxn ang="0">
-                <a:pos x="connsiteX12" y="connsiteY12"/>
-              </a:cxn>
-              <a:cxn ang="0">
-                <a:pos x="connsiteX13" y="connsiteY13"/>
-              </a:cxn>
-              <a:cxn ang="0">
-                <a:pos x="connsiteX14" y="connsiteY14"/>
-              </a:cxn>
-              <a:cxn ang="0">
-                <a:pos x="connsiteX15" y="connsiteY15"/>
-              </a:cxn>
-              <a:cxn ang="0">
-                <a:pos x="connsiteX16" y="connsiteY16"/>
-              </a:cxn>
-            </a:cxnLst>
-            <a:rect l="l" t="t" r="r" b="b"/>
-            <a:pathLst>
-              <a:path w="3642026" h="890852" fill="none" extrusionOk="0">
-                <a:moveTo>
-                  <a:pt x="0" y="0"/>
-                </a:moveTo>
-                <a:cubicBezTo>
-                  <a:pt x="201427" y="-10756"/>
-                  <a:pt x="410235" y="15933"/>
-                  <a:pt x="570584" y="0"/>
-                </a:cubicBezTo>
-                <a:cubicBezTo>
-                  <a:pt x="730933" y="-15933"/>
-                  <a:pt x="893424" y="-21688"/>
-                  <a:pt x="1068328" y="0"/>
-                </a:cubicBezTo>
-                <a:cubicBezTo>
-                  <a:pt x="1243232" y="21688"/>
-                  <a:pt x="1443667" y="23393"/>
-                  <a:pt x="1602491" y="0"/>
-                </a:cubicBezTo>
-                <a:cubicBezTo>
-                  <a:pt x="1761315" y="-23393"/>
-                  <a:pt x="2014919" y="-23039"/>
-                  <a:pt x="2245916" y="0"/>
-                </a:cubicBezTo>
-                <a:cubicBezTo>
-                  <a:pt x="2476914" y="23039"/>
-                  <a:pt x="2691895" y="9073"/>
-                  <a:pt x="2816500" y="0"/>
-                </a:cubicBezTo>
-                <a:cubicBezTo>
-                  <a:pt x="2941105" y="-9073"/>
-                  <a:pt x="3276152" y="-41205"/>
-                  <a:pt x="3642026" y="0"/>
-                </a:cubicBezTo>
-                <a:cubicBezTo>
-                  <a:pt x="3663082" y="100048"/>
-                  <a:pt x="3623691" y="359225"/>
-                  <a:pt x="3642026" y="454335"/>
-                </a:cubicBezTo>
-                <a:cubicBezTo>
-                  <a:pt x="3660361" y="549446"/>
-                  <a:pt x="3636254" y="784806"/>
-                  <a:pt x="3642026" y="890852"/>
-                </a:cubicBezTo>
-                <a:cubicBezTo>
-                  <a:pt x="3398001" y="872893"/>
-                  <a:pt x="3244076" y="878716"/>
-                  <a:pt x="3035022" y="890852"/>
-                </a:cubicBezTo>
-                <a:cubicBezTo>
-                  <a:pt x="2825968" y="902988"/>
-                  <a:pt x="2675414" y="872451"/>
-                  <a:pt x="2500858" y="890852"/>
-                </a:cubicBezTo>
-                <a:cubicBezTo>
-                  <a:pt x="2326302" y="909253"/>
-                  <a:pt x="2003010" y="872489"/>
-                  <a:pt x="1821013" y="890852"/>
-                </a:cubicBezTo>
-                <a:cubicBezTo>
-                  <a:pt x="1639017" y="909215"/>
-                  <a:pt x="1388207" y="897097"/>
-                  <a:pt x="1250429" y="890852"/>
-                </a:cubicBezTo>
-                <a:cubicBezTo>
-                  <a:pt x="1112651" y="884607"/>
-                  <a:pt x="997241" y="912088"/>
-                  <a:pt x="752685" y="890852"/>
-                </a:cubicBezTo>
-                <a:cubicBezTo>
-                  <a:pt x="508129" y="869616"/>
-                  <a:pt x="213969" y="909155"/>
-                  <a:pt x="0" y="890852"/>
-                </a:cubicBezTo>
-                <a:cubicBezTo>
-                  <a:pt x="-3990" y="759468"/>
-                  <a:pt x="-18113" y="585523"/>
-                  <a:pt x="0" y="463243"/>
-                </a:cubicBezTo>
-                <a:cubicBezTo>
-                  <a:pt x="18113" y="340963"/>
-                  <a:pt x="8155" y="221933"/>
-                  <a:pt x="0" y="0"/>
-                </a:cubicBezTo>
-                <a:close/>
-              </a:path>
-              <a:path w="3642026" h="890852" stroke="0" extrusionOk="0">
-                <a:moveTo>
-                  <a:pt x="0" y="0"/>
-                </a:moveTo>
-                <a:cubicBezTo>
-                  <a:pt x="159440" y="1047"/>
-                  <a:pt x="331509" y="-7580"/>
-                  <a:pt x="570584" y="0"/>
-                </a:cubicBezTo>
-                <a:cubicBezTo>
-                  <a:pt x="809659" y="7580"/>
-                  <a:pt x="918772" y="11592"/>
-                  <a:pt x="1068328" y="0"/>
-                </a:cubicBezTo>
-                <a:cubicBezTo>
-                  <a:pt x="1217884" y="-11592"/>
-                  <a:pt x="1447379" y="-10554"/>
-                  <a:pt x="1748172" y="0"/>
-                </a:cubicBezTo>
-                <a:cubicBezTo>
-                  <a:pt x="2048965" y="10554"/>
-                  <a:pt x="2059160" y="-8656"/>
-                  <a:pt x="2318757" y="0"/>
-                </a:cubicBezTo>
-                <a:cubicBezTo>
-                  <a:pt x="2578354" y="8656"/>
-                  <a:pt x="2744360" y="-3041"/>
-                  <a:pt x="2889341" y="0"/>
-                </a:cubicBezTo>
-                <a:cubicBezTo>
-                  <a:pt x="3034322" y="3041"/>
-                  <a:pt x="3330869" y="24518"/>
-                  <a:pt x="3642026" y="0"/>
-                </a:cubicBezTo>
-                <a:cubicBezTo>
-                  <a:pt x="3663296" y="149407"/>
-                  <a:pt x="3651333" y="304291"/>
-                  <a:pt x="3642026" y="427609"/>
-                </a:cubicBezTo>
-                <a:cubicBezTo>
-                  <a:pt x="3632719" y="550927"/>
-                  <a:pt x="3637115" y="777655"/>
-                  <a:pt x="3642026" y="890852"/>
-                </a:cubicBezTo>
-                <a:cubicBezTo>
-                  <a:pt x="3418943" y="867247"/>
-                  <a:pt x="3263341" y="891869"/>
-                  <a:pt x="3107862" y="890852"/>
-                </a:cubicBezTo>
-                <a:cubicBezTo>
-                  <a:pt x="2952383" y="889835"/>
-                  <a:pt x="2686304" y="887164"/>
-                  <a:pt x="2500858" y="890852"/>
-                </a:cubicBezTo>
-                <a:cubicBezTo>
-                  <a:pt x="2315412" y="894540"/>
-                  <a:pt x="2122711" y="905127"/>
-                  <a:pt x="1893854" y="890852"/>
-                </a:cubicBezTo>
-                <a:cubicBezTo>
-                  <a:pt x="1664997" y="876577"/>
-                  <a:pt x="1546311" y="915488"/>
-                  <a:pt x="1323269" y="890852"/>
-                </a:cubicBezTo>
-                <a:cubicBezTo>
-                  <a:pt x="1100228" y="866216"/>
-                  <a:pt x="803431" y="893497"/>
-                  <a:pt x="643425" y="890852"/>
-                </a:cubicBezTo>
-                <a:cubicBezTo>
-                  <a:pt x="483419" y="888207"/>
-                  <a:pt x="190077" y="864827"/>
-                  <a:pt x="0" y="890852"/>
-                </a:cubicBezTo>
-                <a:cubicBezTo>
-                  <a:pt x="-12224" y="758413"/>
-                  <a:pt x="3360" y="623032"/>
-                  <a:pt x="0" y="463243"/>
-                </a:cubicBezTo>
-                <a:cubicBezTo>
-                  <a:pt x="-3360" y="303454"/>
-                  <a:pt x="-5185" y="215819"/>
-                  <a:pt x="0" y="0"/>
-                </a:cubicBezTo>
-                <a:close/>
-              </a:path>
-            </a:pathLst>
-          </a:custGeom>
+          </a:prstGeom>
           <a:solidFill>
-            <a:schemeClr val="accent1">
-              <a:lumMod val="20000"/>
-              <a:lumOff val="80000"/>
-              <a:alpha val="70000"/>
-            </a:schemeClr>
+            <a:schemeClr val="bg1"/>
           </a:solidFill>
           <a:ln>
-            <a:solidFill>
-              <a:schemeClr val="accent1"/>
-            </a:solidFill>
-            <a:extLst>
-              <a:ext uri="{C807C97D-BFC1-408E-A445-0C87EB9F89A2}">
-                <ask:lineSketchStyleProps xmlns:ask="http://schemas.microsoft.com/office/drawing/2018/sketchyshapes" sd="1219033472">
-                  <a:prstGeom prst="rect">
-                    <a:avLst/>
-                  </a:prstGeom>
-                  <ask:type>
-                    <ask:lineSketchFreehand/>
-                  </ask:type>
-                </ask:lineSketchStyleProps>
-              </a:ext>
-            </a:extLst>
+            <a:noFill/>
           </a:ln>
         </p:spPr>
         <p:style>
@@ -5185,8 +5013,8 @@
         </p:nvSpPr>
         <p:spPr>
           <a:xfrm>
-            <a:off x="8669488" y="1080392"/>
-            <a:ext cx="1125629" cy="338554"/>
+            <a:off x="8680635" y="1167435"/>
+            <a:ext cx="1633781" cy="338554"/>
           </a:xfrm>
           <a:prstGeom prst="rect">
             <a:avLst/>
@@ -5201,7 +5029,7 @@
           <a:p>
             <a:r>
               <a:rPr lang="en-US" sz="1600" dirty="0"/>
-              <a:t>Water Tank</a:t>
+              <a:t>Water Tank (1m³)</a:t>
             </a:r>
             <a:endParaRPr lang="de-DE" sz="1600" dirty="0"/>
           </a:p>
@@ -5243,98 +5071,6 @@
           </a:p>
         </p:txBody>
       </p:sp>
-      <p:sp>
-        <p:nvSpPr>
-          <p:cNvPr id="20" name="Flowchart: Summing Junction 19">
-            <a:extLst>
-              <a:ext uri="{FF2B5EF4-FFF2-40B4-BE49-F238E27FC236}">
-                <a16:creationId xmlns:a16="http://schemas.microsoft.com/office/drawing/2014/main" id="{4ADF4D39-76C0-4A70-8377-2CE05DCB3075}"/>
-              </a:ext>
-            </a:extLst>
-          </p:cNvPr>
-          <p:cNvSpPr/>
-          <p:nvPr/>
-        </p:nvSpPr>
-        <p:spPr>
-          <a:xfrm>
-            <a:off x="8318883" y="2604294"/>
-            <a:ext cx="498875" cy="498875"/>
-          </a:xfrm>
-          <a:prstGeom prst="flowChartSummingJunction">
-            <a:avLst/>
-          </a:prstGeom>
-        </p:spPr>
-        <p:style>
-          <a:lnRef idx="2">
-            <a:schemeClr val="accent1">
-              <a:shade val="50000"/>
-            </a:schemeClr>
-          </a:lnRef>
-          <a:fillRef idx="1">
-            <a:schemeClr val="accent1"/>
-          </a:fillRef>
-          <a:effectRef idx="0">
-            <a:schemeClr val="accent1"/>
-          </a:effectRef>
-          <a:fontRef idx="minor">
-            <a:schemeClr val="lt1"/>
-          </a:fontRef>
-        </p:style>
-        <p:txBody>
-          <a:bodyPr rtlCol="0" anchor="ctr"/>
-          <a:lstStyle/>
-          <a:p>
-            <a:pPr algn="ctr"/>
-            <a:endParaRPr lang="de-DE"/>
-          </a:p>
-        </p:txBody>
-      </p:sp>
-      <p:cxnSp>
-        <p:nvCxnSpPr>
-          <p:cNvPr id="24" name="Straight Arrow Connector 23">
-            <a:extLst>
-              <a:ext uri="{FF2B5EF4-FFF2-40B4-BE49-F238E27FC236}">
-                <a16:creationId xmlns:a16="http://schemas.microsoft.com/office/drawing/2014/main" id="{076A55B3-C4EA-4B7C-B920-338279EE2419}"/>
-              </a:ext>
-            </a:extLst>
-          </p:cNvPr>
-          <p:cNvCxnSpPr>
-            <a:cxnSpLocks/>
-            <a:stCxn id="19" idx="2"/>
-          </p:cNvCxnSpPr>
-          <p:nvPr/>
-        </p:nvCxnSpPr>
-        <p:spPr>
-          <a:xfrm>
-            <a:off x="7965743" y="1418946"/>
-            <a:ext cx="552813" cy="1392764"/>
-          </a:xfrm>
-          <a:prstGeom prst="straightConnector1">
-            <a:avLst/>
-          </a:prstGeom>
-          <a:ln w="15875">
-            <a:solidFill>
-              <a:schemeClr val="tx1"/>
-            </a:solidFill>
-            <a:headEnd type="none"/>
-            <a:tailEnd type="oval"/>
-          </a:ln>
-        </p:spPr>
-        <p:style>
-          <a:lnRef idx="1">
-            <a:schemeClr val="accent1"/>
-          </a:lnRef>
-          <a:fillRef idx="0">
-            <a:schemeClr val="accent1"/>
-          </a:fillRef>
-          <a:effectRef idx="0">
-            <a:schemeClr val="accent1"/>
-          </a:effectRef>
-          <a:fontRef idx="minor">
-            <a:schemeClr val="tx1"/>
-          </a:fontRef>
-        </p:style>
-      </p:cxnSp>
       <p:cxnSp>
         <p:nvCxnSpPr>
           <p:cNvPr id="29" name="Straight Connector 28">
@@ -5569,7 +5305,7 @@
         </p:nvSpPr>
         <p:spPr>
           <a:xfrm>
-            <a:off x="563881" y="497928"/>
+            <a:off x="656758" y="144624"/>
             <a:ext cx="3832860" cy="2584022"/>
           </a:xfrm>
           <a:prstGeom prst="rect">
@@ -5643,9 +5379,9 @@
           <p:nvPr/>
         </p:nvSpPr>
         <p:spPr>
-          <a:xfrm rot="18900000">
-            <a:off x="9760319" y="2136161"/>
-            <a:ext cx="1619418" cy="338554"/>
+          <a:xfrm>
+            <a:off x="10635254" y="542394"/>
+            <a:ext cx="1040862" cy="584775"/>
           </a:xfrm>
           <a:prstGeom prst="rect">
             <a:avLst/>
@@ -5658,9 +5394,17 @@
           </a:bodyPr>
           <a:lstStyle/>
           <a:p>
+            <a:pPr algn="ctr"/>
             <a:r>
               <a:rPr lang="en-US" sz="1600" dirty="0"/>
-              <a:t>Tank Level Gauge</a:t>
+              <a:t>Tank Level</a:t>
+            </a:r>
+          </a:p>
+          <a:p>
+            <a:pPr algn="ctr"/>
+            <a:r>
+              <a:rPr lang="en-US" sz="1600" dirty="0"/>
+              <a:t>Gauge</a:t>
             </a:r>
             <a:endParaRPr lang="de-DE" sz="1600" dirty="0"/>
           </a:p>
@@ -5683,8 +5427,8 @@
         </p:nvCxnSpPr>
         <p:spPr>
           <a:xfrm flipH="1">
-            <a:off x="9186280" y="1418946"/>
-            <a:ext cx="46023" cy="524194"/>
+            <a:off x="9280929" y="1505989"/>
+            <a:ext cx="216597" cy="362772"/>
           </a:xfrm>
           <a:prstGeom prst="straightConnector1">
             <a:avLst/>
@@ -6817,7 +6561,7 @@
         </p:nvCxnSpPr>
         <p:spPr>
           <a:xfrm>
-            <a:off x="10210800" y="2977011"/>
+            <a:off x="10175172" y="2977011"/>
             <a:ext cx="211923" cy="0"/>
           </a:xfrm>
           <a:prstGeom prst="line">
@@ -6858,7 +6602,7 @@
         </p:nvCxnSpPr>
         <p:spPr>
           <a:xfrm>
-            <a:off x="10316761" y="2874182"/>
+            <a:off x="10281133" y="2874182"/>
             <a:ext cx="211923" cy="0"/>
           </a:xfrm>
           <a:prstGeom prst="line">
@@ -6899,7 +6643,7 @@
         </p:nvCxnSpPr>
         <p:spPr>
           <a:xfrm>
-            <a:off x="10415821" y="2782742"/>
+            <a:off x="10380193" y="2782742"/>
             <a:ext cx="211923" cy="0"/>
           </a:xfrm>
           <a:prstGeom prst="line">
@@ -6940,7 +6684,7 @@
         </p:nvCxnSpPr>
         <p:spPr>
           <a:xfrm>
-            <a:off x="10521782" y="2676117"/>
+            <a:off x="10486154" y="2676117"/>
             <a:ext cx="211923" cy="0"/>
           </a:xfrm>
           <a:prstGeom prst="line">
@@ -6981,7 +6725,7 @@
         </p:nvCxnSpPr>
         <p:spPr>
           <a:xfrm>
-            <a:off x="10613941" y="2584622"/>
+            <a:off x="10578313" y="2584622"/>
             <a:ext cx="211923" cy="0"/>
           </a:xfrm>
           <a:prstGeom prst="line">
@@ -7022,7 +6766,7 @@
         </p:nvCxnSpPr>
         <p:spPr>
           <a:xfrm>
-            <a:off x="10733705" y="2461341"/>
+            <a:off x="10698077" y="2461341"/>
             <a:ext cx="211923" cy="0"/>
           </a:xfrm>
           <a:prstGeom prst="line">
@@ -7063,7 +6807,7 @@
         </p:nvCxnSpPr>
         <p:spPr>
           <a:xfrm>
-            <a:off x="10839666" y="2353219"/>
+            <a:off x="10804038" y="2353219"/>
             <a:ext cx="211923" cy="0"/>
           </a:xfrm>
           <a:prstGeom prst="line">
@@ -7104,7 +6848,7 @@
         </p:nvCxnSpPr>
         <p:spPr>
           <a:xfrm>
-            <a:off x="10945627" y="2254993"/>
+            <a:off x="10909999" y="2254993"/>
             <a:ext cx="211923" cy="0"/>
           </a:xfrm>
           <a:prstGeom prst="line">
@@ -7145,7 +6889,7 @@
         </p:nvCxnSpPr>
         <p:spPr>
           <a:xfrm>
-            <a:off x="11048281" y="2142662"/>
+            <a:off x="11012653" y="2142662"/>
             <a:ext cx="211923" cy="0"/>
           </a:xfrm>
           <a:prstGeom prst="line">
@@ -7186,7 +6930,7 @@
         </p:nvCxnSpPr>
         <p:spPr>
           <a:xfrm>
-            <a:off x="11154973" y="2035982"/>
+            <a:off x="11119345" y="2035982"/>
             <a:ext cx="211923" cy="0"/>
           </a:xfrm>
           <a:prstGeom prst="line">
@@ -7274,8 +7018,8 @@
         </p:nvSpPr>
         <p:spPr>
           <a:xfrm rot="16200000">
-            <a:off x="11380093" y="3364881"/>
-            <a:ext cx="904415" cy="338554"/>
+            <a:off x="11053629" y="3364881"/>
+            <a:ext cx="1557349" cy="338554"/>
           </a:xfrm>
           <a:prstGeom prst="rect">
             <a:avLst/>
@@ -7290,7 +7034,7 @@
           <a:p>
             <a:r>
               <a:rPr lang="en-US" sz="1600" dirty="0"/>
-              <a:t>11x 3.3V</a:t>
+              <a:t>11x Wires (3.3V)</a:t>
             </a:r>
             <a:endParaRPr lang="de-DE" sz="1600" dirty="0"/>
           </a:p>
@@ -7375,156 +7119,198 @@
           </a:p>
         </p:txBody>
       </p:sp>
-      <p:pic>
-        <p:nvPicPr>
-          <p:cNvPr id="72" name="Graphic 71" descr="Wireless">
-            <a:extLst>
-              <a:ext uri="{FF2B5EF4-FFF2-40B4-BE49-F238E27FC236}">
-                <a16:creationId xmlns:a16="http://schemas.microsoft.com/office/drawing/2014/main" id="{8BB7DE92-7F47-4B04-BC0C-35490F13510B}"/>
-              </a:ext>
-            </a:extLst>
-          </p:cNvPr>
-          <p:cNvPicPr>
-            <a:picLocks noChangeAspect="1"/>
-          </p:cNvPicPr>
+      <p:grpSp>
+        <p:nvGrpSpPr>
+          <p:cNvPr id="114" name="Group 113">
+            <a:extLst>
+              <a:ext uri="{FF2B5EF4-FFF2-40B4-BE49-F238E27FC236}">
+                <a16:creationId xmlns:a16="http://schemas.microsoft.com/office/drawing/2014/main" id="{BEA167E6-CA62-405B-8A01-29752DBF46C9}"/>
+              </a:ext>
+            </a:extLst>
+          </p:cNvPr>
+          <p:cNvGrpSpPr/>
           <p:nvPr/>
-        </p:nvPicPr>
-        <p:blipFill>
-          <a:blip r:embed="rId3">
-            <a:extLst>
-              <a:ext uri="{28A0092B-C50C-407E-A947-70E740481C1C}">
-                <a14:useLocalDpi xmlns:a14="http://schemas.microsoft.com/office/drawing/2010/main" val="0"/>
-              </a:ext>
-              <a:ext uri="{96DAC541-7B7A-43D3-8B79-37D633B846F1}">
-                <asvg:svgBlip xmlns:asvg="http://schemas.microsoft.com/office/drawing/2016/SVG/main" r:embed="rId4"/>
-              </a:ext>
-            </a:extLst>
-          </a:blip>
-          <a:stretch>
-            <a:fillRect/>
-          </a:stretch>
-        </p:blipFill>
-        <p:spPr>
-          <a:xfrm rot="2700000">
-            <a:off x="4085837" y="4487171"/>
-            <a:ext cx="914400" cy="914400"/>
-          </a:xfrm>
-          <a:prstGeom prst="rect">
-            <a:avLst/>
-          </a:prstGeom>
-        </p:spPr>
-      </p:pic>
-      <p:sp>
-        <p:nvSpPr>
-          <p:cNvPr id="74" name="TextBox 73">
-            <a:extLst>
-              <a:ext uri="{FF2B5EF4-FFF2-40B4-BE49-F238E27FC236}">
-                <a16:creationId xmlns:a16="http://schemas.microsoft.com/office/drawing/2014/main" id="{4074F04F-0F16-46F0-8043-4B5DB06B6758}"/>
-              </a:ext>
-            </a:extLst>
-          </p:cNvPr>
-          <p:cNvSpPr txBox="1"/>
+        </p:nvGrpSpPr>
+        <p:grpSpPr>
+          <a:xfrm>
+            <a:off x="4822193" y="4468067"/>
+            <a:ext cx="914400" cy="1230110"/>
+            <a:chOff x="4808413" y="4482068"/>
+            <a:chExt cx="914400" cy="1230110"/>
+          </a:xfrm>
+        </p:grpSpPr>
+        <p:pic>
+          <p:nvPicPr>
+            <p:cNvPr id="72" name="Graphic 71" descr="Wireless">
+              <a:extLst>
+                <a:ext uri="{FF2B5EF4-FFF2-40B4-BE49-F238E27FC236}">
+                  <a16:creationId xmlns:a16="http://schemas.microsoft.com/office/drawing/2014/main" id="{8BB7DE92-7F47-4B04-BC0C-35490F13510B}"/>
+                </a:ext>
+              </a:extLst>
+            </p:cNvPr>
+            <p:cNvPicPr>
+              <a:picLocks noChangeAspect="1"/>
+            </p:cNvPicPr>
+            <p:nvPr/>
+          </p:nvPicPr>
+          <p:blipFill>
+            <a:blip r:embed="rId3">
+              <a:extLst>
+                <a:ext uri="{28A0092B-C50C-407E-A947-70E740481C1C}">
+                  <a14:useLocalDpi xmlns:a14="http://schemas.microsoft.com/office/drawing/2010/main" val="0"/>
+                </a:ext>
+                <a:ext uri="{96DAC541-7B7A-43D3-8B79-37D633B846F1}">
+                  <asvg:svgBlip xmlns:asvg="http://schemas.microsoft.com/office/drawing/2016/SVG/main" r:embed="rId4"/>
+                </a:ext>
+              </a:extLst>
+            </a:blip>
+            <a:stretch>
+              <a:fillRect/>
+            </a:stretch>
+          </p:blipFill>
+          <p:spPr>
+            <a:xfrm rot="2700000">
+              <a:off x="4808413" y="4482068"/>
+              <a:ext cx="914400" cy="914400"/>
+            </a:xfrm>
+            <a:prstGeom prst="rect">
+              <a:avLst/>
+            </a:prstGeom>
+          </p:spPr>
+        </p:pic>
+        <p:sp>
+          <p:nvSpPr>
+            <p:cNvPr id="74" name="TextBox 73">
+              <a:extLst>
+                <a:ext uri="{FF2B5EF4-FFF2-40B4-BE49-F238E27FC236}">
+                  <a16:creationId xmlns:a16="http://schemas.microsoft.com/office/drawing/2014/main" id="{4074F04F-0F16-46F0-8043-4B5DB06B6758}"/>
+                </a:ext>
+              </a:extLst>
+            </p:cNvPr>
+            <p:cNvSpPr txBox="1"/>
+            <p:nvPr/>
+          </p:nvSpPr>
+          <p:spPr>
+            <a:xfrm>
+              <a:off x="4988133" y="5373624"/>
+              <a:ext cx="617477" cy="338554"/>
+            </a:xfrm>
+            <a:prstGeom prst="rect">
+              <a:avLst/>
+            </a:prstGeom>
+            <a:noFill/>
+          </p:spPr>
+          <p:txBody>
+            <a:bodyPr wrap="none" rtlCol="0">
+              <a:spAutoFit/>
+            </a:bodyPr>
+            <a:lstStyle/>
+            <a:p>
+              <a:r>
+                <a:rPr lang="en-US" sz="1600" dirty="0"/>
+                <a:t>Wi-Fi</a:t>
+              </a:r>
+              <a:endParaRPr lang="de-DE" sz="1600" dirty="0"/>
+            </a:p>
+          </p:txBody>
+        </p:sp>
+      </p:grpSp>
+      <p:grpSp>
+        <p:nvGrpSpPr>
+          <p:cNvPr id="125" name="Group 124">
+            <a:extLst>
+              <a:ext uri="{FF2B5EF4-FFF2-40B4-BE49-F238E27FC236}">
+                <a16:creationId xmlns:a16="http://schemas.microsoft.com/office/drawing/2014/main" id="{CE6E2F87-E866-4C56-9F42-32CE1CA1D7E9}"/>
+              </a:ext>
+            </a:extLst>
+          </p:cNvPr>
+          <p:cNvGrpSpPr/>
           <p:nvPr/>
-        </p:nvSpPr>
-        <p:spPr>
+        </p:nvGrpSpPr>
+        <p:grpSpPr>
           <a:xfrm>
-            <a:off x="4236988" y="5365290"/>
-            <a:ext cx="554960" cy="338554"/>
-          </a:xfrm>
-          <a:prstGeom prst="rect">
-            <a:avLst/>
-          </a:prstGeom>
-          <a:noFill/>
-        </p:spPr>
-        <p:txBody>
-          <a:bodyPr wrap="none" rtlCol="0">
-            <a:spAutoFit/>
-          </a:bodyPr>
-          <a:lstStyle/>
-          <a:p>
-            <a:r>
-              <a:rPr lang="en-US" sz="1600" dirty="0" err="1"/>
-              <a:t>WiFi</a:t>
-            </a:r>
-            <a:endParaRPr lang="de-DE" sz="1600" dirty="0"/>
-          </a:p>
-        </p:txBody>
-      </p:sp>
-      <p:pic>
-        <p:nvPicPr>
-          <p:cNvPr id="76" name="Graphic 75" descr="Server">
-            <a:extLst>
-              <a:ext uri="{FF2B5EF4-FFF2-40B4-BE49-F238E27FC236}">
-                <a16:creationId xmlns:a16="http://schemas.microsoft.com/office/drawing/2014/main" id="{6718A1D7-E3C0-4AD9-A621-EDB177400A75}"/>
-              </a:ext>
-            </a:extLst>
-          </p:cNvPr>
-          <p:cNvPicPr>
-            <a:picLocks noChangeAspect="1"/>
-          </p:cNvPicPr>
-          <p:nvPr/>
-        </p:nvPicPr>
-        <p:blipFill>
-          <a:blip r:embed="rId5">
-            <a:extLst>
-              <a:ext uri="{28A0092B-C50C-407E-A947-70E740481C1C}">
-                <a14:useLocalDpi xmlns:a14="http://schemas.microsoft.com/office/drawing/2010/main" val="0"/>
-              </a:ext>
-              <a:ext uri="{96DAC541-7B7A-43D3-8B79-37D633B846F1}">
-                <asvg:svgBlip xmlns:asvg="http://schemas.microsoft.com/office/drawing/2016/SVG/main" r:embed="rId6"/>
-              </a:ext>
-            </a:extLst>
-          </a:blip>
-          <a:stretch>
-            <a:fillRect/>
-          </a:stretch>
-        </p:blipFill>
-        <p:spPr>
-          <a:xfrm>
-            <a:off x="2481364" y="4511303"/>
-            <a:ext cx="914400" cy="914400"/>
-          </a:xfrm>
-          <a:prstGeom prst="rect">
-            <a:avLst/>
-          </a:prstGeom>
-        </p:spPr>
-      </p:pic>
-      <p:sp>
-        <p:nvSpPr>
-          <p:cNvPr id="77" name="TextBox 76">
-            <a:extLst>
-              <a:ext uri="{FF2B5EF4-FFF2-40B4-BE49-F238E27FC236}">
-                <a16:creationId xmlns:a16="http://schemas.microsoft.com/office/drawing/2014/main" id="{EA41C9E9-8690-4781-BA3E-C9A439E37944}"/>
-              </a:ext>
-            </a:extLst>
-          </p:cNvPr>
-          <p:cNvSpPr txBox="1"/>
-          <p:nvPr/>
-        </p:nvSpPr>
-        <p:spPr>
-          <a:xfrm>
-            <a:off x="2677114" y="5414053"/>
-            <a:ext cx="522900" cy="338554"/>
-          </a:xfrm>
-          <a:prstGeom prst="rect">
-            <a:avLst/>
-          </a:prstGeom>
-          <a:noFill/>
-        </p:spPr>
-        <p:txBody>
-          <a:bodyPr wrap="none" rtlCol="0">
-            <a:spAutoFit/>
-          </a:bodyPr>
-          <a:lstStyle/>
-          <a:p>
-            <a:r>
-              <a:rPr lang="en-US" sz="1600" dirty="0"/>
-              <a:t>LAN</a:t>
-            </a:r>
-            <a:endParaRPr lang="de-DE" sz="1600" dirty="0"/>
-          </a:p>
-        </p:txBody>
-      </p:sp>
+            <a:off x="3148114" y="4517653"/>
+            <a:ext cx="914400" cy="1180524"/>
+            <a:chOff x="3148114" y="4517653"/>
+            <a:chExt cx="914400" cy="1180524"/>
+          </a:xfrm>
+        </p:grpSpPr>
+        <p:pic>
+          <p:nvPicPr>
+            <p:cNvPr id="76" name="Graphic 75" descr="Server">
+              <a:extLst>
+                <a:ext uri="{FF2B5EF4-FFF2-40B4-BE49-F238E27FC236}">
+                  <a16:creationId xmlns:a16="http://schemas.microsoft.com/office/drawing/2014/main" id="{6718A1D7-E3C0-4AD9-A621-EDB177400A75}"/>
+                </a:ext>
+              </a:extLst>
+            </p:cNvPr>
+            <p:cNvPicPr>
+              <a:picLocks noChangeAspect="1"/>
+            </p:cNvPicPr>
+            <p:nvPr/>
+          </p:nvPicPr>
+          <p:blipFill>
+            <a:blip r:embed="rId5">
+              <a:extLst>
+                <a:ext uri="{28A0092B-C50C-407E-A947-70E740481C1C}">
+                  <a14:useLocalDpi xmlns:a14="http://schemas.microsoft.com/office/drawing/2010/main" val="0"/>
+                </a:ext>
+                <a:ext uri="{96DAC541-7B7A-43D3-8B79-37D633B846F1}">
+                  <asvg:svgBlip xmlns:asvg="http://schemas.microsoft.com/office/drawing/2016/SVG/main" r:embed="rId6"/>
+                </a:ext>
+              </a:extLst>
+            </a:blip>
+            <a:stretch>
+              <a:fillRect/>
+            </a:stretch>
+          </p:blipFill>
+          <p:spPr>
+            <a:xfrm>
+              <a:off x="3148114" y="4517653"/>
+              <a:ext cx="914400" cy="914400"/>
+            </a:xfrm>
+            <a:prstGeom prst="rect">
+              <a:avLst/>
+            </a:prstGeom>
+          </p:spPr>
+        </p:pic>
+        <p:sp>
+          <p:nvSpPr>
+            <p:cNvPr id="77" name="TextBox 76">
+              <a:extLst>
+                <a:ext uri="{FF2B5EF4-FFF2-40B4-BE49-F238E27FC236}">
+                  <a16:creationId xmlns:a16="http://schemas.microsoft.com/office/drawing/2014/main" id="{EA41C9E9-8690-4781-BA3E-C9A439E37944}"/>
+                </a:ext>
+              </a:extLst>
+            </p:cNvPr>
+            <p:cNvSpPr txBox="1"/>
+            <p:nvPr/>
+          </p:nvSpPr>
+          <p:spPr>
+            <a:xfrm>
+              <a:off x="3343864" y="5359623"/>
+              <a:ext cx="522900" cy="338554"/>
+            </a:xfrm>
+            <a:prstGeom prst="rect">
+              <a:avLst/>
+            </a:prstGeom>
+            <a:noFill/>
+          </p:spPr>
+          <p:txBody>
+            <a:bodyPr wrap="none" rtlCol="0">
+              <a:spAutoFit/>
+            </a:bodyPr>
+            <a:lstStyle/>
+            <a:p>
+              <a:r>
+                <a:rPr lang="en-US" sz="1600" dirty="0"/>
+                <a:t>LAN</a:t>
+              </a:r>
+              <a:endParaRPr lang="de-DE" sz="1600" dirty="0"/>
+            </a:p>
+          </p:txBody>
+        </p:sp>
+      </p:grpSp>
       <p:cxnSp>
         <p:nvCxnSpPr>
           <p:cNvPr id="92" name="Straight Connector 91">
@@ -7537,13 +7323,14 @@
           <p:cNvCxnSpPr>
             <a:cxnSpLocks/>
             <a:stCxn id="31" idx="1"/>
+            <a:endCxn id="72" idx="3"/>
           </p:cNvCxnSpPr>
           <p:nvPr/>
         </p:nvCxnSpPr>
         <p:spPr>
-          <a:xfrm flipH="1">
-            <a:off x="4777740" y="5248805"/>
-            <a:ext cx="1318260" cy="0"/>
+          <a:xfrm flipH="1" flipV="1">
+            <a:off x="5602682" y="5248556"/>
+            <a:ext cx="493318" cy="249"/>
           </a:xfrm>
           <a:prstGeom prst="line">
             <a:avLst/>
@@ -7576,13 +7363,14 @@
           </p:cNvPr>
           <p:cNvCxnSpPr>
             <a:cxnSpLocks/>
+            <a:stCxn id="72" idx="2"/>
           </p:cNvCxnSpPr>
           <p:nvPr/>
         </p:nvCxnSpPr>
         <p:spPr>
-          <a:xfrm flipH="1">
-            <a:off x="3284220" y="5248805"/>
-            <a:ext cx="1021080" cy="0"/>
+          <a:xfrm flipH="1" flipV="1">
+            <a:off x="3943784" y="5248321"/>
+            <a:ext cx="1012320" cy="235"/>
           </a:xfrm>
           <a:prstGeom prst="line">
             <a:avLst/>
@@ -7614,21 +7402,24 @@
             </a:extLst>
           </p:cNvPr>
           <p:cNvCxnSpPr>
+            <a:cxnSpLocks/>
             <a:endCxn id="34" idx="2"/>
           </p:cNvCxnSpPr>
           <p:nvPr/>
         </p:nvCxnSpPr>
         <p:spPr>
           <a:xfrm rot="16200000" flipV="1">
-            <a:off x="1455939" y="4106323"/>
-            <a:ext cx="2166855" cy="118109"/>
+            <a:off x="1666497" y="3635338"/>
+            <a:ext cx="2519675" cy="706291"/>
           </a:xfrm>
           <a:prstGeom prst="bentConnector3">
             <a:avLst>
-              <a:gd name="adj1" fmla="val -288"/>
+              <a:gd name="adj1" fmla="val -151"/>
             </a:avLst>
           </a:prstGeom>
-          <a:ln w="15875"/>
+          <a:ln w="15875">
+            <a:tailEnd type="triangle"/>
+          </a:ln>
         </p:spPr>
         <p:style>
           <a:lnRef idx="1">
@@ -7696,14 +7487,32 @@
           <a:p>
             <a:pPr algn="ctr"/>
             <a:r>
-              <a:rPr lang="en-US" sz="1400" dirty="0">
+              <a:rPr lang="en-US" sz="1000" dirty="0">
+                <a:solidFill>
+                  <a:prstClr val="black"/>
+                </a:solidFill>
+                <a:latin typeface="Courier New" panose="02070309020205020404" pitchFamily="49" charset="0"/>
+                <a:cs typeface="Courier New" panose="02070309020205020404" pitchFamily="49" charset="0"/>
+              </a:rPr>
+              <a:t>python</a:t>
+            </a:r>
+            <a:endParaRPr lang="en-US" sz="1200" dirty="0">
+              <a:solidFill>
+                <a:schemeClr val="tx1"/>
+              </a:solidFill>
+            </a:endParaRPr>
+          </a:p>
+          <a:p>
+            <a:pPr algn="ctr"/>
+            <a:r>
+              <a:rPr lang="en-US" sz="1200" dirty="0">
                 <a:solidFill>
                   <a:schemeClr val="tx1"/>
                 </a:solidFill>
               </a:rPr>
-              <a:t>read tank level / GPIO</a:t>
+              <a:t>read tank level</a:t>
             </a:r>
-            <a:endParaRPr lang="de-DE" sz="1400" dirty="0">
+            <a:endParaRPr lang="de-DE" sz="1200" dirty="0">
               <a:solidFill>
                 <a:schemeClr val="tx1"/>
               </a:solidFill>
@@ -7762,38 +7571,42 @@
           <a:p>
             <a:pPr algn="ctr"/>
             <a:r>
-              <a:rPr lang="en-US" sz="1400" dirty="0">
+              <a:rPr lang="en-US" sz="1000" dirty="0">
+                <a:solidFill>
+                  <a:schemeClr val="tx1"/>
+                </a:solidFill>
+                <a:latin typeface="Courier New" panose="02070309020205020404" pitchFamily="49" charset="0"/>
+                <a:cs typeface="Courier New" panose="02070309020205020404" pitchFamily="49" charset="0"/>
+              </a:rPr>
+              <a:t>python</a:t>
+            </a:r>
+            <a:br>
+              <a:rPr lang="en-US" sz="1200" dirty="0">
                 <a:solidFill>
                   <a:schemeClr val="tx1"/>
                 </a:solidFill>
               </a:rPr>
-              <a:t>pump </a:t>
-            </a:r>
+            </a:br>
             <a:r>
-              <a:rPr lang="en-US" sz="1400" dirty="0" err="1">
+              <a:rPr lang="en-US" sz="1200" dirty="0">
                 <a:solidFill>
                   <a:schemeClr val="tx1"/>
                 </a:solidFill>
               </a:rPr>
-              <a:t>relais</a:t>
+              <a:t>pump relay</a:t>
             </a:r>
-            <a:endParaRPr lang="en-US" sz="1400" dirty="0">
-              <a:solidFill>
-                <a:schemeClr val="tx1"/>
-              </a:solidFill>
-            </a:endParaRPr>
           </a:p>
           <a:p>
             <a:pPr algn="ctr"/>
             <a:r>
-              <a:rPr lang="en-US" sz="1400" dirty="0">
+              <a:rPr lang="en-US" sz="1200" dirty="0">
                 <a:solidFill>
                   <a:schemeClr val="tx1"/>
                 </a:solidFill>
               </a:rPr>
-              <a:t>control / GPIO</a:t>
+              <a:t>control</a:t>
             </a:r>
-            <a:endParaRPr lang="de-DE" sz="1400" dirty="0">
+            <a:endParaRPr lang="de-DE" sz="1200" dirty="0">
               <a:solidFill>
                 <a:schemeClr val="tx1"/>
               </a:solidFill>
@@ -8104,13 +7917,16 @@
         <p:spPr>
           <a:xfrm>
             <a:off x="6424089" y="5196293"/>
-            <a:ext cx="1930881" cy="1137194"/>
+            <a:ext cx="1427391" cy="1137194"/>
           </a:xfrm>
           <a:prstGeom prst="rect">
             <a:avLst/>
           </a:prstGeom>
           <a:solidFill>
-            <a:schemeClr val="bg2"/>
+            <a:schemeClr val="tx2">
+              <a:lumMod val="60000"/>
+              <a:lumOff val="40000"/>
+            </a:schemeClr>
           </a:solidFill>
           <a:ln>
             <a:solidFill>
@@ -8140,20 +7956,12 @@
           <a:p>
             <a:pPr algn="ctr"/>
             <a:r>
-              <a:rPr lang="en-US" sz="1400" dirty="0" err="1">
-                <a:solidFill>
-                  <a:schemeClr val="tx1"/>
-                </a:solidFill>
-              </a:rPr>
-              <a:t>nginx</a:t>
-            </a:r>
-            <a:r>
               <a:rPr lang="en-US" sz="1400" dirty="0">
                 <a:solidFill>
                   <a:schemeClr val="tx1"/>
                 </a:solidFill>
               </a:rPr>
-              <a:t> webserver</a:t>
+              <a:t>nginx webserver</a:t>
             </a:r>
             <a:endParaRPr lang="de-DE" sz="1400" dirty="0">
               <a:solidFill>
@@ -8177,7 +7985,7 @@
         </p:nvSpPr>
         <p:spPr>
           <a:xfrm>
-            <a:off x="6961573" y="5491413"/>
+            <a:off x="6693451" y="5490057"/>
             <a:ext cx="888665" cy="546955"/>
           </a:xfrm>
           <a:prstGeom prst="rect">
@@ -8214,7 +8022,25 @@
           <a:p>
             <a:pPr algn="ctr"/>
             <a:r>
-              <a:rPr lang="en-US" sz="1400" dirty="0">
+              <a:rPr lang="en-US" sz="1000" dirty="0">
+                <a:solidFill>
+                  <a:prstClr val="black"/>
+                </a:solidFill>
+                <a:latin typeface="Courier New" panose="02070309020205020404" pitchFamily="49" charset="0"/>
+                <a:cs typeface="Courier New" panose="02070309020205020404" pitchFamily="49" charset="0"/>
+              </a:rPr>
+              <a:t>python</a:t>
+            </a:r>
+            <a:endParaRPr lang="en-US" sz="1200" dirty="0">
+              <a:solidFill>
+                <a:schemeClr val="tx1"/>
+              </a:solidFill>
+            </a:endParaRPr>
+          </a:p>
+          <a:p>
+            <a:pPr algn="ctr"/>
+            <a:r>
+              <a:rPr lang="en-US" sz="1200" dirty="0">
                 <a:solidFill>
                   <a:schemeClr val="tx1"/>
                 </a:solidFill>
@@ -8225,83 +8051,14 @@
           <a:p>
             <a:pPr algn="ctr"/>
             <a:r>
-              <a:rPr lang="en-US" sz="1400" dirty="0">
+              <a:rPr lang="en-US" sz="1200" dirty="0">
                 <a:solidFill>
                   <a:schemeClr val="tx1"/>
                 </a:solidFill>
               </a:rPr>
               <a:t>app</a:t>
             </a:r>
-            <a:endParaRPr lang="de-DE" sz="1400" dirty="0">
-              <a:solidFill>
-                <a:schemeClr val="tx1"/>
-              </a:solidFill>
-            </a:endParaRPr>
-          </a:p>
-        </p:txBody>
-      </p:sp>
-      <p:sp>
-        <p:nvSpPr>
-          <p:cNvPr id="119" name="Rectangle 118">
-            <a:extLst>
-              <a:ext uri="{FF2B5EF4-FFF2-40B4-BE49-F238E27FC236}">
-                <a16:creationId xmlns:a16="http://schemas.microsoft.com/office/drawing/2014/main" id="{C55BB2B2-7FA9-4B82-8DA9-99D00DEBA600}"/>
-              </a:ext>
-            </a:extLst>
-          </p:cNvPr>
-          <p:cNvSpPr/>
-          <p:nvPr/>
-        </p:nvSpPr>
-        <p:spPr>
-          <a:xfrm>
-            <a:off x="8865870" y="5087097"/>
-            <a:ext cx="1077865" cy="1355589"/>
-          </a:xfrm>
-          <a:prstGeom prst="rect">
-            <a:avLst/>
-          </a:prstGeom>
-          <a:solidFill>
-            <a:schemeClr val="bg2"/>
-          </a:solidFill>
-          <a:ln>
-            <a:solidFill>
-              <a:schemeClr val="tx1"/>
-            </a:solidFill>
-          </a:ln>
-        </p:spPr>
-        <p:style>
-          <a:lnRef idx="2">
-            <a:schemeClr val="accent1">
-              <a:shade val="50000"/>
-            </a:schemeClr>
-          </a:lnRef>
-          <a:fillRef idx="1">
-            <a:schemeClr val="accent1"/>
-          </a:fillRef>
-          <a:effectRef idx="0">
-            <a:schemeClr val="accent1"/>
-          </a:effectRef>
-          <a:fontRef idx="minor">
-            <a:schemeClr val="lt1"/>
-          </a:fontRef>
-        </p:style>
-        <p:txBody>
-          <a:bodyPr rtlCol="0" anchor="t"/>
-          <a:lstStyle/>
-          <a:p>
-            <a:pPr algn="ctr"/>
-            <a:r>
-              <a:rPr lang="en-US" sz="1400" dirty="0">
-                <a:solidFill>
-                  <a:schemeClr val="tx1"/>
-                </a:solidFill>
-              </a:rPr>
-              <a:t>text files</a:t>
-            </a:r>
-          </a:p>
-          <a:p>
-            <a:pPr algn="ctr"/>
-            <a:endParaRPr lang="de-DE" sz="1400" dirty="0">
+            <a:endParaRPr lang="de-DE" sz="1200" dirty="0">
               <a:solidFill>
                 <a:schemeClr val="tx1"/>
               </a:solidFill>
@@ -8333,7 +8090,9 @@
           <a:prstGeom prst="line">
             <a:avLst/>
           </a:prstGeom>
-          <a:ln w="15875"/>
+          <a:ln w="15875">
+            <a:headEnd type="triangle"/>
+          </a:ln>
         </p:spPr>
         <p:style>
           <a:lnRef idx="1">
@@ -8368,13 +8127,16 @@
         </p:nvCxnSpPr>
         <p:spPr>
           <a:xfrm flipH="1" flipV="1">
-            <a:off x="7850238" y="5764891"/>
-            <a:ext cx="1015632" cy="1"/>
+            <a:off x="7582116" y="5763535"/>
+            <a:ext cx="1010803" cy="1357"/>
           </a:xfrm>
           <a:prstGeom prst="line">
             <a:avLst/>
           </a:prstGeom>
-          <a:ln w="15875"/>
+          <a:ln w="15875">
+            <a:headEnd type="triangle"/>
+            <a:tailEnd type="triangle"/>
+          </a:ln>
         </p:spPr>
         <p:style>
           <a:lnRef idx="1">
@@ -8442,14 +8204,32 @@
           <a:p>
             <a:pPr algn="ctr"/>
             <a:r>
-              <a:rPr lang="en-US" sz="1400" dirty="0">
+              <a:rPr lang="en-US" sz="1000" dirty="0">
+                <a:solidFill>
+                  <a:prstClr val="black"/>
+                </a:solidFill>
+                <a:latin typeface="Courier New" panose="02070309020205020404" pitchFamily="49" charset="0"/>
+                <a:cs typeface="Courier New" panose="02070309020205020404" pitchFamily="49" charset="0"/>
+              </a:rPr>
+              <a:t>python</a:t>
+            </a:r>
+            <a:endParaRPr lang="en-US" sz="1200" dirty="0">
+              <a:solidFill>
+                <a:schemeClr val="tx1"/>
+              </a:solidFill>
+            </a:endParaRPr>
+          </a:p>
+          <a:p>
+            <a:pPr algn="ctr"/>
+            <a:r>
+              <a:rPr lang="en-US" sz="1200" dirty="0">
                 <a:solidFill>
                   <a:schemeClr val="tx1"/>
                 </a:solidFill>
               </a:rPr>
               <a:t>control logic</a:t>
             </a:r>
-            <a:endParaRPr lang="de-DE" sz="1400" dirty="0">
+            <a:endParaRPr lang="de-DE" sz="1200" dirty="0">
               <a:solidFill>
                 <a:schemeClr val="tx1"/>
               </a:solidFill>
@@ -8481,48 +8261,9 @@
           <a:prstGeom prst="line">
             <a:avLst/>
           </a:prstGeom>
-          <a:ln w="15875"/>
-        </p:spPr>
-        <p:style>
-          <a:lnRef idx="1">
-            <a:schemeClr val="dk1"/>
-          </a:lnRef>
-          <a:fillRef idx="0">
-            <a:schemeClr val="dk1"/>
-          </a:fillRef>
-          <a:effectRef idx="0">
-            <a:schemeClr val="dk1"/>
-          </a:effectRef>
-          <a:fontRef idx="minor">
-            <a:schemeClr val="tx1"/>
-          </a:fontRef>
-        </p:style>
-      </p:cxnSp>
-      <p:cxnSp>
-        <p:nvCxnSpPr>
-          <p:cNvPr id="134" name="Straight Connector 133">
-            <a:extLst>
-              <a:ext uri="{FF2B5EF4-FFF2-40B4-BE49-F238E27FC236}">
-                <a16:creationId xmlns:a16="http://schemas.microsoft.com/office/drawing/2014/main" id="{FA0B1FF9-C289-45BE-8033-17C3EE516A58}"/>
-              </a:ext>
-            </a:extLst>
-          </p:cNvPr>
-          <p:cNvCxnSpPr>
-            <a:cxnSpLocks/>
-            <a:stCxn id="129" idx="2"/>
-            <a:endCxn id="119" idx="0"/>
-          </p:cNvCxnSpPr>
-          <p:nvPr/>
-        </p:nvCxnSpPr>
-        <p:spPr>
-          <a:xfrm flipH="1">
-            <a:off x="9404803" y="4590121"/>
-            <a:ext cx="467626" cy="496976"/>
-          </a:xfrm>
-          <a:prstGeom prst="line">
-            <a:avLst/>
-          </a:prstGeom>
-          <a:ln w="15875"/>
+          <a:ln w="15875">
+            <a:tailEnd type="triangle"/>
+          </a:ln>
         </p:spPr>
         <p:style>
           <a:lnRef idx="1">
@@ -8563,7 +8304,9 @@
           <a:prstGeom prst="bentConnector2">
             <a:avLst/>
           </a:prstGeom>
-          <a:ln w="15875"/>
+          <a:ln w="15875">
+            <a:tailEnd type="triangle"/>
+          </a:ln>
         </p:spPr>
         <p:style>
           <a:lnRef idx="1">
@@ -8597,9 +8340,9 @@
           <p:nvPr/>
         </p:nvCxnSpPr>
         <p:spPr>
-          <a:xfrm flipH="1" flipV="1">
-            <a:off x="6424089" y="5764890"/>
-            <a:ext cx="537484" cy="1"/>
+          <a:xfrm flipH="1">
+            <a:off x="6424089" y="5763535"/>
+            <a:ext cx="269362" cy="1355"/>
           </a:xfrm>
           <a:prstGeom prst="line">
             <a:avLst/>
@@ -8645,7 +8388,9 @@
           <a:prstGeom prst="line">
             <a:avLst/>
           </a:prstGeom>
-          <a:ln w="15875"/>
+          <a:ln w="15875">
+            <a:tailEnd type="triangle"/>
+          </a:ln>
         </p:spPr>
         <p:style>
           <a:lnRef idx="1">
@@ -8662,12 +8407,577 @@
           </a:fontRef>
         </p:style>
       </p:cxnSp>
+      <p:grpSp>
+        <p:nvGrpSpPr>
+          <p:cNvPr id="47" name="Group 46">
+            <a:extLst>
+              <a:ext uri="{FF2B5EF4-FFF2-40B4-BE49-F238E27FC236}">
+                <a16:creationId xmlns:a16="http://schemas.microsoft.com/office/drawing/2014/main" id="{813AAB4F-0C5A-42A0-863F-221AFCF6DC22}"/>
+              </a:ext>
+            </a:extLst>
+          </p:cNvPr>
+          <p:cNvGrpSpPr/>
+          <p:nvPr/>
+        </p:nvGrpSpPr>
+        <p:grpSpPr>
+          <a:xfrm>
+            <a:off x="8592919" y="5087097"/>
+            <a:ext cx="1077865" cy="1355589"/>
+            <a:chOff x="8865870" y="5087097"/>
+            <a:chExt cx="1077865" cy="1355589"/>
+          </a:xfrm>
+        </p:grpSpPr>
+        <p:sp>
+          <p:nvSpPr>
+            <p:cNvPr id="119" name="Rectangle 118">
+              <a:extLst>
+                <a:ext uri="{FF2B5EF4-FFF2-40B4-BE49-F238E27FC236}">
+                  <a16:creationId xmlns:a16="http://schemas.microsoft.com/office/drawing/2014/main" id="{C55BB2B2-7FA9-4B82-8DA9-99D00DEBA600}"/>
+                </a:ext>
+              </a:extLst>
+            </p:cNvPr>
+            <p:cNvSpPr/>
+            <p:nvPr/>
+          </p:nvSpPr>
+          <p:spPr>
+            <a:xfrm>
+              <a:off x="8865870" y="5087097"/>
+              <a:ext cx="1077865" cy="1355589"/>
+            </a:xfrm>
+            <a:prstGeom prst="rect">
+              <a:avLst/>
+            </a:prstGeom>
+            <a:solidFill>
+              <a:schemeClr val="bg2"/>
+            </a:solidFill>
+            <a:ln>
+              <a:solidFill>
+                <a:schemeClr val="tx1"/>
+              </a:solidFill>
+              <a:prstDash val="dash"/>
+            </a:ln>
+          </p:spPr>
+          <p:style>
+            <a:lnRef idx="2">
+              <a:schemeClr val="accent1">
+                <a:shade val="50000"/>
+              </a:schemeClr>
+            </a:lnRef>
+            <a:fillRef idx="1">
+              <a:schemeClr val="accent1"/>
+            </a:fillRef>
+            <a:effectRef idx="0">
+              <a:schemeClr val="accent1"/>
+            </a:effectRef>
+            <a:fontRef idx="minor">
+              <a:schemeClr val="lt1"/>
+            </a:fontRef>
+          </p:style>
+          <p:txBody>
+            <a:bodyPr rtlCol="0" anchor="t"/>
+            <a:lstStyle/>
+            <a:p>
+              <a:pPr algn="ctr"/>
+              <a:r>
+                <a:rPr lang="en-US" sz="1200" dirty="0">
+                  <a:solidFill>
+                    <a:schemeClr val="tx1"/>
+                  </a:solidFill>
+                </a:rPr>
+                <a:t>text files</a:t>
+              </a:r>
+            </a:p>
+            <a:p>
+              <a:pPr algn="ctr"/>
+              <a:endParaRPr lang="de-DE" sz="1400" dirty="0">
+                <a:solidFill>
+                  <a:schemeClr val="tx1"/>
+                </a:solidFill>
+              </a:endParaRPr>
+            </a:p>
+          </p:txBody>
+        </p:sp>
+        <p:sp>
+          <p:nvSpPr>
+            <p:cNvPr id="186" name="Rectangle 185">
+              <a:extLst>
+                <a:ext uri="{FF2B5EF4-FFF2-40B4-BE49-F238E27FC236}">
+                  <a16:creationId xmlns:a16="http://schemas.microsoft.com/office/drawing/2014/main" id="{4B2EA2A6-DB1F-4BCD-9BBB-7CEC24ACFCA7}"/>
+                </a:ext>
+              </a:extLst>
+            </p:cNvPr>
+            <p:cNvSpPr/>
+            <p:nvPr/>
+          </p:nvSpPr>
+          <p:spPr>
+            <a:xfrm>
+              <a:off x="8940800" y="5391415"/>
+              <a:ext cx="874341" cy="199536"/>
+            </a:xfrm>
+            <a:prstGeom prst="rect">
+              <a:avLst/>
+            </a:prstGeom>
+            <a:solidFill>
+              <a:schemeClr val="bg2"/>
+            </a:solidFill>
+            <a:ln>
+              <a:solidFill>
+                <a:schemeClr val="tx1"/>
+              </a:solidFill>
+            </a:ln>
+          </p:spPr>
+          <p:style>
+            <a:lnRef idx="2">
+              <a:schemeClr val="accent1">
+                <a:shade val="50000"/>
+              </a:schemeClr>
+            </a:lnRef>
+            <a:fillRef idx="1">
+              <a:schemeClr val="accent1"/>
+            </a:fillRef>
+            <a:effectRef idx="0">
+              <a:schemeClr val="accent1"/>
+            </a:effectRef>
+            <a:fontRef idx="minor">
+              <a:schemeClr val="lt1"/>
+            </a:fontRef>
+          </p:style>
+          <p:txBody>
+            <a:bodyPr rtlCol="0" anchor="ctr"/>
+            <a:lstStyle/>
+            <a:p>
+              <a:pPr algn="ctr"/>
+              <a:r>
+                <a:rPr lang="en-US" sz="1050" dirty="0">
+                  <a:solidFill>
+                    <a:schemeClr val="tx1"/>
+                  </a:solidFill>
+                </a:rPr>
+                <a:t>schedule.csv</a:t>
+              </a:r>
+              <a:endParaRPr lang="de-DE" sz="1050" dirty="0">
+                <a:solidFill>
+                  <a:schemeClr val="tx1"/>
+                </a:solidFill>
+              </a:endParaRPr>
+            </a:p>
+          </p:txBody>
+        </p:sp>
+        <p:sp>
+          <p:nvSpPr>
+            <p:cNvPr id="187" name="Rectangle 186">
+              <a:extLst>
+                <a:ext uri="{FF2B5EF4-FFF2-40B4-BE49-F238E27FC236}">
+                  <a16:creationId xmlns:a16="http://schemas.microsoft.com/office/drawing/2014/main" id="{381FC6F8-C60D-41B9-9E3D-E3755D206DDF}"/>
+                </a:ext>
+              </a:extLst>
+            </p:cNvPr>
+            <p:cNvSpPr/>
+            <p:nvPr/>
+          </p:nvSpPr>
+          <p:spPr>
+            <a:xfrm>
+              <a:off x="8940800" y="5634052"/>
+              <a:ext cx="874341" cy="199536"/>
+            </a:xfrm>
+            <a:prstGeom prst="rect">
+              <a:avLst/>
+            </a:prstGeom>
+            <a:solidFill>
+              <a:schemeClr val="bg2"/>
+            </a:solidFill>
+            <a:ln>
+              <a:solidFill>
+                <a:schemeClr val="tx1"/>
+              </a:solidFill>
+            </a:ln>
+          </p:spPr>
+          <p:style>
+            <a:lnRef idx="2">
+              <a:schemeClr val="accent1">
+                <a:shade val="50000"/>
+              </a:schemeClr>
+            </a:lnRef>
+            <a:fillRef idx="1">
+              <a:schemeClr val="accent1"/>
+            </a:fillRef>
+            <a:effectRef idx="0">
+              <a:schemeClr val="accent1"/>
+            </a:effectRef>
+            <a:fontRef idx="minor">
+              <a:schemeClr val="lt1"/>
+            </a:fontRef>
+          </p:style>
+          <p:txBody>
+            <a:bodyPr rtlCol="0" anchor="ctr"/>
+            <a:lstStyle/>
+            <a:p>
+              <a:pPr algn="ctr"/>
+              <a:r>
+                <a:rPr lang="en-US" sz="1050" dirty="0" err="1">
+                  <a:solidFill>
+                    <a:schemeClr val="tx1"/>
+                  </a:solidFill>
+                </a:rPr>
+                <a:t>mode.cfg</a:t>
+              </a:r>
+              <a:endParaRPr lang="de-DE" sz="1050" dirty="0">
+                <a:solidFill>
+                  <a:schemeClr val="tx1"/>
+                </a:solidFill>
+              </a:endParaRPr>
+            </a:p>
+          </p:txBody>
+        </p:sp>
+        <p:sp>
+          <p:nvSpPr>
+            <p:cNvPr id="188" name="Rectangle 187">
+              <a:extLst>
+                <a:ext uri="{FF2B5EF4-FFF2-40B4-BE49-F238E27FC236}">
+                  <a16:creationId xmlns:a16="http://schemas.microsoft.com/office/drawing/2014/main" id="{4DF7F199-BAF8-4D65-82D8-5C4D54A181CE}"/>
+                </a:ext>
+              </a:extLst>
+            </p:cNvPr>
+            <p:cNvSpPr/>
+            <p:nvPr/>
+          </p:nvSpPr>
+          <p:spPr>
+            <a:xfrm>
+              <a:off x="8942861" y="5872012"/>
+              <a:ext cx="874341" cy="199536"/>
+            </a:xfrm>
+            <a:prstGeom prst="rect">
+              <a:avLst/>
+            </a:prstGeom>
+            <a:solidFill>
+              <a:schemeClr val="bg2"/>
+            </a:solidFill>
+            <a:ln>
+              <a:solidFill>
+                <a:schemeClr val="tx1"/>
+              </a:solidFill>
+            </a:ln>
+          </p:spPr>
+          <p:style>
+            <a:lnRef idx="2">
+              <a:schemeClr val="accent1">
+                <a:shade val="50000"/>
+              </a:schemeClr>
+            </a:lnRef>
+            <a:fillRef idx="1">
+              <a:schemeClr val="accent1"/>
+            </a:fillRef>
+            <a:effectRef idx="0">
+              <a:schemeClr val="accent1"/>
+            </a:effectRef>
+            <a:fontRef idx="minor">
+              <a:schemeClr val="lt1"/>
+            </a:fontRef>
+          </p:style>
+          <p:txBody>
+            <a:bodyPr rtlCol="0" anchor="ctr"/>
+            <a:lstStyle/>
+            <a:p>
+              <a:pPr algn="ctr"/>
+              <a:r>
+                <a:rPr lang="en-US" sz="1050" dirty="0" err="1">
+                  <a:solidFill>
+                    <a:schemeClr val="tx1"/>
+                  </a:solidFill>
+                </a:rPr>
+                <a:t>timer.cfg</a:t>
+              </a:r>
+              <a:endParaRPr lang="de-DE" sz="1050" dirty="0">
+                <a:solidFill>
+                  <a:schemeClr val="tx1"/>
+                </a:solidFill>
+              </a:endParaRPr>
+            </a:p>
+          </p:txBody>
+        </p:sp>
+        <p:sp>
+          <p:nvSpPr>
+            <p:cNvPr id="189" name="Rectangle 188">
+              <a:extLst>
+                <a:ext uri="{FF2B5EF4-FFF2-40B4-BE49-F238E27FC236}">
+                  <a16:creationId xmlns:a16="http://schemas.microsoft.com/office/drawing/2014/main" id="{E8328257-015C-421A-B7D7-FC57C5FF5F6B}"/>
+                </a:ext>
+              </a:extLst>
+            </p:cNvPr>
+            <p:cNvSpPr/>
+            <p:nvPr/>
+          </p:nvSpPr>
+          <p:spPr>
+            <a:xfrm>
+              <a:off x="8940800" y="6109972"/>
+              <a:ext cx="874341" cy="199536"/>
+            </a:xfrm>
+            <a:prstGeom prst="rect">
+              <a:avLst/>
+            </a:prstGeom>
+            <a:solidFill>
+              <a:schemeClr val="bg2"/>
+            </a:solidFill>
+            <a:ln>
+              <a:solidFill>
+                <a:schemeClr val="tx1"/>
+              </a:solidFill>
+            </a:ln>
+          </p:spPr>
+          <p:style>
+            <a:lnRef idx="2">
+              <a:schemeClr val="accent1">
+                <a:shade val="50000"/>
+              </a:schemeClr>
+            </a:lnRef>
+            <a:fillRef idx="1">
+              <a:schemeClr val="accent1"/>
+            </a:fillRef>
+            <a:effectRef idx="0">
+              <a:schemeClr val="accent1"/>
+            </a:effectRef>
+            <a:fontRef idx="minor">
+              <a:schemeClr val="lt1"/>
+            </a:fontRef>
+          </p:style>
+          <p:txBody>
+            <a:bodyPr rtlCol="0" anchor="ctr"/>
+            <a:lstStyle/>
+            <a:p>
+              <a:pPr algn="ctr"/>
+              <a:r>
+                <a:rPr lang="en-US" sz="1050" dirty="0" err="1">
+                  <a:solidFill>
+                    <a:schemeClr val="tx1"/>
+                  </a:solidFill>
+                </a:rPr>
+                <a:t>manual.cfg</a:t>
+              </a:r>
+              <a:endParaRPr lang="de-DE" sz="1050" dirty="0">
+                <a:solidFill>
+                  <a:schemeClr val="tx1"/>
+                </a:solidFill>
+              </a:endParaRPr>
+            </a:p>
+          </p:txBody>
+        </p:sp>
+      </p:grpSp>
       <p:sp>
         <p:nvSpPr>
-          <p:cNvPr id="186" name="Rectangle 185">
-            <a:extLst>
-              <a:ext uri="{FF2B5EF4-FFF2-40B4-BE49-F238E27FC236}">
-                <a16:creationId xmlns:a16="http://schemas.microsoft.com/office/drawing/2014/main" id="{4B2EA2A6-DB1F-4BCD-9BBB-7CEC24ACFCA7}"/>
+          <p:cNvPr id="198" name="TextBox 197">
+            <a:extLst>
+              <a:ext uri="{FF2B5EF4-FFF2-40B4-BE49-F238E27FC236}">
+                <a16:creationId xmlns:a16="http://schemas.microsoft.com/office/drawing/2014/main" id="{6333412B-CF20-4656-8302-DB37BC5F5D69}"/>
+              </a:ext>
+            </a:extLst>
+          </p:cNvPr>
+          <p:cNvSpPr txBox="1"/>
+          <p:nvPr/>
+        </p:nvSpPr>
+        <p:spPr>
+          <a:xfrm>
+            <a:off x="7793557" y="5538460"/>
+            <a:ext cx="856581" cy="276999"/>
+          </a:xfrm>
+          <a:prstGeom prst="rect">
+            <a:avLst/>
+          </a:prstGeom>
+          <a:noFill/>
+        </p:spPr>
+        <p:txBody>
+          <a:bodyPr wrap="none" rtlCol="0">
+            <a:spAutoFit/>
+          </a:bodyPr>
+          <a:lstStyle/>
+          <a:p>
+            <a:r>
+              <a:rPr lang="en-US" sz="1200" dirty="0" err="1"/>
+              <a:t>uwsgi</a:t>
+            </a:r>
+            <a:r>
+              <a:rPr lang="en-US" sz="1200" dirty="0"/>
+              <a:t> R/W</a:t>
+            </a:r>
+            <a:endParaRPr lang="de-DE" sz="1200" dirty="0"/>
+          </a:p>
+        </p:txBody>
+      </p:sp>
+      <p:sp>
+        <p:nvSpPr>
+          <p:cNvPr id="199" name="TextBox 198">
+            <a:extLst>
+              <a:ext uri="{FF2B5EF4-FFF2-40B4-BE49-F238E27FC236}">
+                <a16:creationId xmlns:a16="http://schemas.microsoft.com/office/drawing/2014/main" id="{03DCF01F-8CFE-4515-9DB9-48551D76D6F3}"/>
+              </a:ext>
+            </a:extLst>
+          </p:cNvPr>
+          <p:cNvSpPr txBox="1"/>
+          <p:nvPr/>
+        </p:nvSpPr>
+        <p:spPr>
+          <a:xfrm>
+            <a:off x="9228146" y="4616597"/>
+            <a:ext cx="463588" cy="276999"/>
+          </a:xfrm>
+          <a:prstGeom prst="rect">
+            <a:avLst/>
+          </a:prstGeom>
+          <a:noFill/>
+        </p:spPr>
+        <p:txBody>
+          <a:bodyPr wrap="none" rtlCol="0">
+            <a:spAutoFit/>
+          </a:bodyPr>
+          <a:lstStyle/>
+          <a:p>
+            <a:r>
+              <a:rPr lang="en-US" sz="1200" dirty="0"/>
+              <a:t>R/W</a:t>
+            </a:r>
+            <a:endParaRPr lang="de-DE" sz="1200" dirty="0"/>
+          </a:p>
+        </p:txBody>
+      </p:sp>
+      <p:sp>
+        <p:nvSpPr>
+          <p:cNvPr id="200" name="TextBox 199">
+            <a:extLst>
+              <a:ext uri="{FF2B5EF4-FFF2-40B4-BE49-F238E27FC236}">
+                <a16:creationId xmlns:a16="http://schemas.microsoft.com/office/drawing/2014/main" id="{BF106B45-3653-4010-A620-60DA9D403ED9}"/>
+              </a:ext>
+            </a:extLst>
+          </p:cNvPr>
+          <p:cNvSpPr txBox="1"/>
+          <p:nvPr/>
+        </p:nvSpPr>
+        <p:spPr>
+          <a:xfrm>
+            <a:off x="1283500" y="3135237"/>
+            <a:ext cx="768159" cy="338554"/>
+          </a:xfrm>
+          <a:prstGeom prst="rect">
+            <a:avLst/>
+          </a:prstGeom>
+          <a:noFill/>
+        </p:spPr>
+        <p:txBody>
+          <a:bodyPr wrap="none" rtlCol="0">
+            <a:spAutoFit/>
+          </a:bodyPr>
+          <a:lstStyle/>
+          <a:p>
+            <a:r>
+              <a:rPr lang="en-US" sz="1600" dirty="0"/>
+              <a:t>(+VPN)</a:t>
+            </a:r>
+            <a:endParaRPr lang="de-DE" sz="1600" dirty="0"/>
+          </a:p>
+        </p:txBody>
+      </p:sp>
+      <p:sp>
+        <p:nvSpPr>
+          <p:cNvPr id="78" name="Moon 77">
+            <a:extLst>
+              <a:ext uri="{FF2B5EF4-FFF2-40B4-BE49-F238E27FC236}">
+                <a16:creationId xmlns:a16="http://schemas.microsoft.com/office/drawing/2014/main" id="{E8AB2010-EDBF-4A2B-B13B-F385505A735D}"/>
+              </a:ext>
+            </a:extLst>
+          </p:cNvPr>
+          <p:cNvSpPr/>
+          <p:nvPr/>
+        </p:nvSpPr>
+        <p:spPr>
+          <a:xfrm rot="13871668">
+            <a:off x="10980896" y="2354500"/>
+            <a:ext cx="576079" cy="1214411"/>
+          </a:xfrm>
+          <a:prstGeom prst="moon">
+            <a:avLst/>
+          </a:prstGeom>
+          <a:solidFill>
+            <a:schemeClr val="bg1"/>
+          </a:solidFill>
+          <a:ln>
+            <a:noFill/>
+          </a:ln>
+        </p:spPr>
+        <p:style>
+          <a:lnRef idx="2">
+            <a:schemeClr val="accent1">
+              <a:shade val="50000"/>
+            </a:schemeClr>
+          </a:lnRef>
+          <a:fillRef idx="1">
+            <a:schemeClr val="accent1"/>
+          </a:fillRef>
+          <a:effectRef idx="0">
+            <a:schemeClr val="accent1"/>
+          </a:effectRef>
+          <a:fontRef idx="minor">
+            <a:schemeClr val="lt1"/>
+          </a:fontRef>
+        </p:style>
+        <p:txBody>
+          <a:bodyPr rtlCol="0" anchor="ctr"/>
+          <a:lstStyle/>
+          <a:p>
+            <a:pPr algn="ctr"/>
+            <a:endParaRPr lang="de-DE"/>
+          </a:p>
+        </p:txBody>
+      </p:sp>
+      <p:cxnSp>
+        <p:nvCxnSpPr>
+          <p:cNvPr id="81" name="Straight Arrow Connector 80">
+            <a:extLst>
+              <a:ext uri="{FF2B5EF4-FFF2-40B4-BE49-F238E27FC236}">
+                <a16:creationId xmlns:a16="http://schemas.microsoft.com/office/drawing/2014/main" id="{3C02FEDB-FC09-434E-88B4-B5ECE4CB1FF4}"/>
+              </a:ext>
+            </a:extLst>
+          </p:cNvPr>
+          <p:cNvCxnSpPr>
+            <a:cxnSpLocks/>
+            <a:stCxn id="38" idx="2"/>
+          </p:cNvCxnSpPr>
+          <p:nvPr/>
+        </p:nvCxnSpPr>
+        <p:spPr>
+          <a:xfrm flipH="1">
+            <a:off x="10979052" y="1127169"/>
+            <a:ext cx="176633" cy="1026099"/>
+          </a:xfrm>
+          <a:prstGeom prst="straightConnector1">
+            <a:avLst/>
+          </a:prstGeom>
+          <a:ln w="15875">
+            <a:solidFill>
+              <a:schemeClr val="tx1"/>
+            </a:solidFill>
+            <a:headEnd type="none"/>
+            <a:tailEnd type="oval"/>
+          </a:ln>
+        </p:spPr>
+        <p:style>
+          <a:lnRef idx="1">
+            <a:schemeClr val="accent1"/>
+          </a:lnRef>
+          <a:fillRef idx="0">
+            <a:schemeClr val="accent1"/>
+          </a:fillRef>
+          <a:effectRef idx="0">
+            <a:schemeClr val="accent1"/>
+          </a:effectRef>
+          <a:fontRef idx="minor">
+            <a:schemeClr val="tx1"/>
+          </a:fontRef>
+        </p:style>
+      </p:cxnSp>
+      <p:sp>
+        <p:nvSpPr>
+          <p:cNvPr id="84" name="Rectangle 83">
+            <a:extLst>
+              <a:ext uri="{FF2B5EF4-FFF2-40B4-BE49-F238E27FC236}">
+                <a16:creationId xmlns:a16="http://schemas.microsoft.com/office/drawing/2014/main" id="{5491A781-DD2E-4D64-A625-B24E20AF7969}"/>
               </a:ext>
             </a:extLst>
           </p:cNvPr>
@@ -8676,8 +8986,8 @@
         </p:nvSpPr>
         <p:spPr>
           <a:xfrm>
-            <a:off x="8940800" y="5391415"/>
-            <a:ext cx="874341" cy="199536"/>
+            <a:off x="10274104" y="5883646"/>
+            <a:ext cx="888665" cy="546955"/>
           </a:xfrm>
           <a:prstGeom prst="rect">
             <a:avLst/>
@@ -8713,14 +9023,32 @@
           <a:p>
             <a:pPr algn="ctr"/>
             <a:r>
-              <a:rPr lang="en-US" sz="1050" dirty="0">
+              <a:rPr lang="en-US" sz="1000" dirty="0">
+                <a:solidFill>
+                  <a:prstClr val="black"/>
+                </a:solidFill>
+                <a:latin typeface="Courier New" panose="02070309020205020404" pitchFamily="49" charset="0"/>
+                <a:cs typeface="Courier New" panose="02070309020205020404" pitchFamily="49" charset="0"/>
+              </a:rPr>
+              <a:t>python</a:t>
+            </a:r>
+            <a:endParaRPr lang="en-US" sz="1200" dirty="0">
+              <a:solidFill>
+                <a:schemeClr val="tx1"/>
+              </a:solidFill>
+            </a:endParaRPr>
+          </a:p>
+          <a:p>
+            <a:pPr algn="ctr"/>
+            <a:r>
+              <a:rPr lang="en-US" sz="1200" dirty="0">
                 <a:solidFill>
                   <a:schemeClr val="tx1"/>
                 </a:solidFill>
               </a:rPr>
-              <a:t>schedule.csv</a:t>
+              <a:t>REST / POST call</a:t>
             </a:r>
-            <a:endParaRPr lang="de-DE" sz="1050" dirty="0">
+            <a:endParaRPr lang="de-DE" sz="1200" dirty="0">
               <a:solidFill>
                 <a:schemeClr val="tx1"/>
               </a:solidFill>
@@ -8728,12 +9056,189 @@
           </a:p>
         </p:txBody>
       </p:sp>
+      <p:cxnSp>
+        <p:nvCxnSpPr>
+          <p:cNvPr id="85" name="Straight Connector 84">
+            <a:extLst>
+              <a:ext uri="{FF2B5EF4-FFF2-40B4-BE49-F238E27FC236}">
+                <a16:creationId xmlns:a16="http://schemas.microsoft.com/office/drawing/2014/main" id="{46E765F7-4C4B-49A1-A945-2F93676AA839}"/>
+              </a:ext>
+            </a:extLst>
+          </p:cNvPr>
+          <p:cNvCxnSpPr>
+            <a:cxnSpLocks/>
+            <a:stCxn id="84" idx="0"/>
+            <a:endCxn id="101" idx="2"/>
+          </p:cNvCxnSpPr>
+          <p:nvPr/>
+        </p:nvCxnSpPr>
+        <p:spPr>
+          <a:xfrm flipV="1">
+            <a:off x="10718437" y="5658581"/>
+            <a:ext cx="0" cy="225065"/>
+          </a:xfrm>
+          <a:prstGeom prst="line">
+            <a:avLst/>
+          </a:prstGeom>
+          <a:ln w="15875">
+            <a:headEnd type="triangle"/>
+          </a:ln>
+        </p:spPr>
+        <p:style>
+          <a:lnRef idx="1">
+            <a:schemeClr val="dk1"/>
+          </a:lnRef>
+          <a:fillRef idx="0">
+            <a:schemeClr val="dk1"/>
+          </a:fillRef>
+          <a:effectRef idx="0">
+            <a:schemeClr val="dk1"/>
+          </a:effectRef>
+          <a:fontRef idx="minor">
+            <a:schemeClr val="tx1"/>
+          </a:fontRef>
+        </p:style>
+      </p:cxnSp>
+      <p:cxnSp>
+        <p:nvCxnSpPr>
+          <p:cNvPr id="98" name="Connector: Elbow 97">
+            <a:extLst>
+              <a:ext uri="{FF2B5EF4-FFF2-40B4-BE49-F238E27FC236}">
+                <a16:creationId xmlns:a16="http://schemas.microsoft.com/office/drawing/2014/main" id="{B62911E0-B94F-4714-8052-C569EB5E5D67}"/>
+              </a:ext>
+            </a:extLst>
+          </p:cNvPr>
+          <p:cNvCxnSpPr>
+            <a:cxnSpLocks/>
+            <a:stCxn id="84" idx="1"/>
+          </p:cNvCxnSpPr>
+          <p:nvPr/>
+        </p:nvCxnSpPr>
+        <p:spPr>
+          <a:xfrm rot="10800000">
+            <a:off x="9962778" y="4596632"/>
+            <a:ext cx="311326" cy="1560493"/>
+          </a:xfrm>
+          <a:prstGeom prst="bentConnector2">
+            <a:avLst/>
+          </a:prstGeom>
+          <a:ln w="15875">
+            <a:headEnd type="triangle"/>
+          </a:ln>
+        </p:spPr>
+        <p:style>
+          <a:lnRef idx="1">
+            <a:schemeClr val="dk1"/>
+          </a:lnRef>
+          <a:fillRef idx="0">
+            <a:schemeClr val="dk1"/>
+          </a:fillRef>
+          <a:effectRef idx="0">
+            <a:schemeClr val="dk1"/>
+          </a:effectRef>
+          <a:fontRef idx="minor">
+            <a:schemeClr val="tx1"/>
+          </a:fontRef>
+        </p:style>
+      </p:cxnSp>
+      <p:cxnSp>
+        <p:nvCxnSpPr>
+          <p:cNvPr id="104" name="Connector: Elbow 103">
+            <a:extLst>
+              <a:ext uri="{FF2B5EF4-FFF2-40B4-BE49-F238E27FC236}">
+                <a16:creationId xmlns:a16="http://schemas.microsoft.com/office/drawing/2014/main" id="{E60BE672-E2DD-428E-9524-9A6D25AEAB2B}"/>
+              </a:ext>
+            </a:extLst>
+          </p:cNvPr>
+          <p:cNvCxnSpPr>
+            <a:cxnSpLocks/>
+            <a:stCxn id="119" idx="0"/>
+            <a:endCxn id="129" idx="2"/>
+          </p:cNvCxnSpPr>
+          <p:nvPr/>
+        </p:nvCxnSpPr>
+        <p:spPr>
+          <a:xfrm rot="5400000" flipH="1" flipV="1">
+            <a:off x="9253652" y="4468321"/>
+            <a:ext cx="496976" cy="740577"/>
+          </a:xfrm>
+          <a:prstGeom prst="bentConnector3">
+            <a:avLst>
+              <a:gd name="adj1" fmla="val 50000"/>
+            </a:avLst>
+          </a:prstGeom>
+          <a:ln w="15875">
+            <a:headEnd type="triangle"/>
+            <a:tailEnd type="triangle"/>
+          </a:ln>
+        </p:spPr>
+        <p:style>
+          <a:lnRef idx="1">
+            <a:schemeClr val="dk1"/>
+          </a:lnRef>
+          <a:fillRef idx="0">
+            <a:schemeClr val="dk1"/>
+          </a:fillRef>
+          <a:effectRef idx="0">
+            <a:schemeClr val="dk1"/>
+          </a:effectRef>
+          <a:fontRef idx="minor">
+            <a:schemeClr val="tx1"/>
+          </a:fontRef>
+        </p:style>
+      </p:cxnSp>
+      <p:cxnSp>
+        <p:nvCxnSpPr>
+          <p:cNvPr id="121" name="Connector: Elbow 120">
+            <a:extLst>
+              <a:ext uri="{FF2B5EF4-FFF2-40B4-BE49-F238E27FC236}">
+                <a16:creationId xmlns:a16="http://schemas.microsoft.com/office/drawing/2014/main" id="{F8DD5F67-6552-445D-B365-32EC29D25B09}"/>
+              </a:ext>
+            </a:extLst>
+          </p:cNvPr>
+          <p:cNvCxnSpPr>
+            <a:cxnSpLocks/>
+            <a:stCxn id="122" idx="3"/>
+            <a:endCxn id="84" idx="2"/>
+          </p:cNvCxnSpPr>
+          <p:nvPr/>
+        </p:nvCxnSpPr>
+        <p:spPr>
+          <a:xfrm>
+            <a:off x="2173517" y="6209740"/>
+            <a:ext cx="8544920" cy="220861"/>
+          </a:xfrm>
+          <a:prstGeom prst="bentConnector4">
+            <a:avLst>
+              <a:gd name="adj1" fmla="val 9321"/>
+              <a:gd name="adj2" fmla="val 203504"/>
+            </a:avLst>
+          </a:prstGeom>
+          <a:ln w="15875">
+            <a:headEnd type="triangle"/>
+          </a:ln>
+        </p:spPr>
+        <p:style>
+          <a:lnRef idx="1">
+            <a:schemeClr val="dk1"/>
+          </a:lnRef>
+          <a:fillRef idx="0">
+            <a:schemeClr val="dk1"/>
+          </a:fillRef>
+          <a:effectRef idx="0">
+            <a:schemeClr val="dk1"/>
+          </a:effectRef>
+          <a:fontRef idx="minor">
+            <a:schemeClr val="tx1"/>
+          </a:fontRef>
+        </p:style>
+      </p:cxnSp>
       <p:sp>
         <p:nvSpPr>
-          <p:cNvPr id="187" name="Rectangle 186">
-            <a:extLst>
-              <a:ext uri="{FF2B5EF4-FFF2-40B4-BE49-F238E27FC236}">
-                <a16:creationId xmlns:a16="http://schemas.microsoft.com/office/drawing/2014/main" id="{381FC6F8-C60D-41B9-9E3D-E3755D206DDF}"/>
+          <p:cNvPr id="122" name="Rectangle 121">
+            <a:extLst>
+              <a:ext uri="{FF2B5EF4-FFF2-40B4-BE49-F238E27FC236}">
+                <a16:creationId xmlns:a16="http://schemas.microsoft.com/office/drawing/2014/main" id="{6B2C6DF4-AED9-4F0E-A9DA-CB6F9D8BE6DB}"/>
               </a:ext>
             </a:extLst>
           </p:cNvPr>
@@ -8742,8 +9247,397 @@
         </p:nvSpPr>
         <p:spPr>
           <a:xfrm>
-            <a:off x="8940800" y="5634052"/>
-            <a:ext cx="874341" cy="199536"/>
+            <a:off x="773607" y="5792785"/>
+            <a:ext cx="1399910" cy="833910"/>
+          </a:xfrm>
+          <a:prstGeom prst="rect">
+            <a:avLst/>
+          </a:prstGeom>
+          <a:noFill/>
+          <a:ln>
+            <a:solidFill>
+              <a:schemeClr val="tx1"/>
+            </a:solidFill>
+          </a:ln>
+        </p:spPr>
+        <p:style>
+          <a:lnRef idx="2">
+            <a:schemeClr val="accent1">
+              <a:shade val="50000"/>
+            </a:schemeClr>
+          </a:lnRef>
+          <a:fillRef idx="1">
+            <a:schemeClr val="accent1"/>
+          </a:fillRef>
+          <a:effectRef idx="0">
+            <a:schemeClr val="accent1"/>
+          </a:effectRef>
+          <a:fontRef idx="minor">
+            <a:schemeClr val="lt1"/>
+          </a:fontRef>
+        </p:style>
+        <p:txBody>
+          <a:bodyPr rtlCol="0" anchor="ctr"/>
+          <a:lstStyle/>
+          <a:p>
+            <a:pPr algn="ctr"/>
+            <a:r>
+              <a:rPr lang="en-US" sz="1600" b="1" dirty="0" err="1">
+                <a:solidFill>
+                  <a:schemeClr val="tx1"/>
+                </a:solidFill>
+              </a:rPr>
+              <a:t>Thingspeak</a:t>
+            </a:r>
+            <a:endParaRPr lang="en-US" sz="1600" b="1" dirty="0">
+              <a:solidFill>
+                <a:schemeClr val="tx1"/>
+              </a:solidFill>
+            </a:endParaRPr>
+          </a:p>
+          <a:p>
+            <a:pPr algn="ctr"/>
+            <a:r>
+              <a:rPr lang="en-US" sz="1600" b="1" dirty="0">
+                <a:solidFill>
+                  <a:schemeClr val="tx1"/>
+                </a:solidFill>
+              </a:rPr>
+              <a:t>IoT Platform</a:t>
+            </a:r>
+            <a:endParaRPr lang="de-DE" sz="1600" b="1" dirty="0">
+              <a:solidFill>
+                <a:schemeClr val="tx1"/>
+              </a:solidFill>
+            </a:endParaRPr>
+          </a:p>
+        </p:txBody>
+      </p:sp>
+      <p:pic>
+        <p:nvPicPr>
+          <p:cNvPr id="90" name="Graphic 89" descr="Users">
+            <a:extLst>
+              <a:ext uri="{FF2B5EF4-FFF2-40B4-BE49-F238E27FC236}">
+                <a16:creationId xmlns:a16="http://schemas.microsoft.com/office/drawing/2014/main" id="{F6BE521E-479B-44F2-9B01-3AE95BA09779}"/>
+              </a:ext>
+            </a:extLst>
+          </p:cNvPr>
+          <p:cNvPicPr>
+            <a:picLocks noChangeAspect="1"/>
+          </p:cNvPicPr>
+          <p:nvPr/>
+        </p:nvPicPr>
+        <p:blipFill>
+          <a:blip r:embed="rId7">
+            <a:extLst>
+              <a:ext uri="{28A0092B-C50C-407E-A947-70E740481C1C}">
+                <a14:useLocalDpi xmlns:a14="http://schemas.microsoft.com/office/drawing/2010/main" val="0"/>
+              </a:ext>
+              <a:ext uri="{96DAC541-7B7A-43D3-8B79-37D633B846F1}">
+                <asvg:svgBlip xmlns:asvg="http://schemas.microsoft.com/office/drawing/2016/SVG/main" r:embed="rId8"/>
+              </a:ext>
+            </a:extLst>
+          </a:blip>
+          <a:stretch>
+            <a:fillRect/>
+          </a:stretch>
+        </p:blipFill>
+        <p:spPr>
+          <a:xfrm>
+            <a:off x="497179" y="3641680"/>
+            <a:ext cx="914400" cy="914400"/>
+          </a:xfrm>
+          <a:prstGeom prst="rect">
+            <a:avLst/>
+          </a:prstGeom>
+        </p:spPr>
+      </p:pic>
+      <p:cxnSp>
+        <p:nvCxnSpPr>
+          <p:cNvPr id="126" name="Straight Connector 125">
+            <a:extLst>
+              <a:ext uri="{FF2B5EF4-FFF2-40B4-BE49-F238E27FC236}">
+                <a16:creationId xmlns:a16="http://schemas.microsoft.com/office/drawing/2014/main" id="{983F1BEA-9B85-409E-91F2-534FE453E3D7}"/>
+              </a:ext>
+            </a:extLst>
+          </p:cNvPr>
+          <p:cNvCxnSpPr>
+            <a:cxnSpLocks/>
+            <a:endCxn id="90" idx="0"/>
+          </p:cNvCxnSpPr>
+          <p:nvPr/>
+        </p:nvCxnSpPr>
+        <p:spPr>
+          <a:xfrm flipH="1">
+            <a:off x="954379" y="2718721"/>
+            <a:ext cx="908949" cy="922959"/>
+          </a:xfrm>
+          <a:prstGeom prst="line">
+            <a:avLst/>
+          </a:prstGeom>
+          <a:ln w="15875">
+            <a:headEnd type="arrow"/>
+          </a:ln>
+        </p:spPr>
+        <p:style>
+          <a:lnRef idx="1">
+            <a:schemeClr val="dk1"/>
+          </a:lnRef>
+          <a:fillRef idx="0">
+            <a:schemeClr val="dk1"/>
+          </a:fillRef>
+          <a:effectRef idx="0">
+            <a:schemeClr val="dk1"/>
+          </a:effectRef>
+          <a:fontRef idx="minor">
+            <a:schemeClr val="tx1"/>
+          </a:fontRef>
+        </p:style>
+      </p:cxnSp>
+      <p:cxnSp>
+        <p:nvCxnSpPr>
+          <p:cNvPr id="130" name="Straight Connector 129">
+            <a:extLst>
+              <a:ext uri="{FF2B5EF4-FFF2-40B4-BE49-F238E27FC236}">
+                <a16:creationId xmlns:a16="http://schemas.microsoft.com/office/drawing/2014/main" id="{BD77F962-468E-4038-8E96-CB4EC4FBB007}"/>
+              </a:ext>
+            </a:extLst>
+          </p:cNvPr>
+          <p:cNvCxnSpPr>
+            <a:cxnSpLocks/>
+            <a:stCxn id="122" idx="0"/>
+            <a:endCxn id="90" idx="2"/>
+          </p:cNvCxnSpPr>
+          <p:nvPr/>
+        </p:nvCxnSpPr>
+        <p:spPr>
+          <a:xfrm flipH="1" flipV="1">
+            <a:off x="954379" y="4556080"/>
+            <a:ext cx="519183" cy="1236705"/>
+          </a:xfrm>
+          <a:prstGeom prst="line">
+            <a:avLst/>
+          </a:prstGeom>
+          <a:ln w="15875">
+            <a:headEnd type="arrow"/>
+          </a:ln>
+        </p:spPr>
+        <p:style>
+          <a:lnRef idx="1">
+            <a:schemeClr val="dk1"/>
+          </a:lnRef>
+          <a:fillRef idx="0">
+            <a:schemeClr val="dk1"/>
+          </a:fillRef>
+          <a:effectRef idx="0">
+            <a:schemeClr val="dk1"/>
+          </a:effectRef>
+          <a:fontRef idx="minor">
+            <a:schemeClr val="tx1"/>
+          </a:fontRef>
+        </p:style>
+      </p:cxnSp>
+      <p:sp>
+        <p:nvSpPr>
+          <p:cNvPr id="133" name="TextBox 132">
+            <a:extLst>
+              <a:ext uri="{FF2B5EF4-FFF2-40B4-BE49-F238E27FC236}">
+                <a16:creationId xmlns:a16="http://schemas.microsoft.com/office/drawing/2014/main" id="{3F04FF8A-7EAA-4853-BF9B-63B2F3FBF365}"/>
+              </a:ext>
+            </a:extLst>
+          </p:cNvPr>
+          <p:cNvSpPr txBox="1"/>
+          <p:nvPr/>
+        </p:nvSpPr>
+        <p:spPr>
+          <a:xfrm>
+            <a:off x="2385286" y="59804"/>
+            <a:ext cx="2335604" cy="1038701"/>
+          </a:xfrm>
+          <a:prstGeom prst="ellipse">
+            <a:avLst/>
+          </a:prstGeom>
+          <a:solidFill>
+            <a:schemeClr val="accent6">
+              <a:lumMod val="40000"/>
+              <a:lumOff val="60000"/>
+            </a:schemeClr>
+          </a:solidFill>
+          <a:effectLst>
+            <a:outerShdw blurRad="50800" dist="38100" dir="2700000" algn="tl" rotWithShape="0">
+              <a:prstClr val="black">
+                <a:alpha val="40000"/>
+              </a:prstClr>
+            </a:outerShdw>
+          </a:effectLst>
+        </p:spPr>
+        <p:txBody>
+          <a:bodyPr wrap="square" lIns="0" tIns="0" rIns="0" bIns="0" rtlCol="0">
+            <a:spAutoFit/>
+          </a:bodyPr>
+          <a:lstStyle/>
+          <a:p>
+            <a:pPr marL="285750" indent="-285750">
+              <a:buFont typeface="Wingdings" panose="05000000000000000000" pitchFamily="2" charset="2"/>
+              <a:buChar char="ü"/>
+            </a:pPr>
+            <a:r>
+              <a:rPr lang="en-US" sz="1600" dirty="0"/>
+              <a:t>Check tank level</a:t>
+            </a:r>
+          </a:p>
+          <a:p>
+            <a:pPr marL="285750" indent="-285750">
+              <a:buFont typeface="Wingdings" panose="05000000000000000000" pitchFamily="2" charset="2"/>
+              <a:buChar char="ü"/>
+            </a:pPr>
+            <a:r>
+              <a:rPr lang="en-US" sz="1600" dirty="0"/>
+              <a:t>Control pump operation</a:t>
+            </a:r>
+            <a:endParaRPr lang="de-DE" sz="1600" dirty="0"/>
+          </a:p>
+        </p:txBody>
+      </p:sp>
+      <p:cxnSp>
+        <p:nvCxnSpPr>
+          <p:cNvPr id="135" name="Straight Connector 134">
+            <a:extLst>
+              <a:ext uri="{FF2B5EF4-FFF2-40B4-BE49-F238E27FC236}">
+                <a16:creationId xmlns:a16="http://schemas.microsoft.com/office/drawing/2014/main" id="{DC3EFD65-381F-47A7-A973-ED3140A56FDD}"/>
+              </a:ext>
+            </a:extLst>
+          </p:cNvPr>
+          <p:cNvCxnSpPr>
+            <a:cxnSpLocks/>
+            <a:stCxn id="122" idx="0"/>
+            <a:endCxn id="34" idx="2"/>
+          </p:cNvCxnSpPr>
+          <p:nvPr/>
+        </p:nvCxnSpPr>
+        <p:spPr>
+          <a:xfrm flipV="1">
+            <a:off x="1473562" y="2728646"/>
+            <a:ext cx="1099626" cy="3064139"/>
+          </a:xfrm>
+          <a:prstGeom prst="line">
+            <a:avLst/>
+          </a:prstGeom>
+          <a:ln w="15875">
+            <a:tailEnd type="triangle"/>
+          </a:ln>
+        </p:spPr>
+        <p:style>
+          <a:lnRef idx="1">
+            <a:schemeClr val="dk1"/>
+          </a:lnRef>
+          <a:fillRef idx="0">
+            <a:schemeClr val="dk1"/>
+          </a:fillRef>
+          <a:effectRef idx="0">
+            <a:schemeClr val="dk1"/>
+          </a:effectRef>
+          <a:fontRef idx="minor">
+            <a:schemeClr val="tx1"/>
+          </a:fontRef>
+        </p:style>
+      </p:cxnSp>
+      <p:sp>
+        <p:nvSpPr>
+          <p:cNvPr id="164" name="TextBox 163">
+            <a:extLst>
+              <a:ext uri="{FF2B5EF4-FFF2-40B4-BE49-F238E27FC236}">
+                <a16:creationId xmlns:a16="http://schemas.microsoft.com/office/drawing/2014/main" id="{1E079B2C-968B-4AC7-ABF0-11D4BA2E120A}"/>
+              </a:ext>
+            </a:extLst>
+          </p:cNvPr>
+          <p:cNvSpPr txBox="1"/>
+          <p:nvPr/>
+        </p:nvSpPr>
+        <p:spPr>
+          <a:xfrm>
+            <a:off x="4933691" y="321990"/>
+            <a:ext cx="2258695" cy="369332"/>
+          </a:xfrm>
+          <a:prstGeom prst="rect">
+            <a:avLst/>
+          </a:prstGeom>
+          <a:noFill/>
+        </p:spPr>
+        <p:txBody>
+          <a:bodyPr wrap="none" rtlCol="0">
+            <a:spAutoFit/>
+          </a:bodyPr>
+          <a:lstStyle/>
+          <a:p>
+            <a:r>
+              <a:rPr lang="en-US" b="1" dirty="0"/>
+              <a:t>OR Pond Control </a:t>
+            </a:r>
+            <a:r>
+              <a:rPr lang="en-US" dirty="0"/>
+              <a:t>by </a:t>
+            </a:r>
+            <a:r>
+              <a:rPr lang="en-US" dirty="0" err="1"/>
+              <a:t>js</a:t>
+            </a:r>
+            <a:endParaRPr lang="de-DE" dirty="0"/>
+          </a:p>
+        </p:txBody>
+      </p:sp>
+      <p:sp>
+        <p:nvSpPr>
+          <p:cNvPr id="166" name="TextBox 165">
+            <a:extLst>
+              <a:ext uri="{FF2B5EF4-FFF2-40B4-BE49-F238E27FC236}">
+                <a16:creationId xmlns:a16="http://schemas.microsoft.com/office/drawing/2014/main" id="{C24B0B1C-7886-4559-B958-F706A280E885}"/>
+              </a:ext>
+            </a:extLst>
+          </p:cNvPr>
+          <p:cNvSpPr txBox="1"/>
+          <p:nvPr/>
+        </p:nvSpPr>
+        <p:spPr>
+          <a:xfrm>
+            <a:off x="5655160" y="6778"/>
+            <a:ext cx="1537857" cy="400110"/>
+          </a:xfrm>
+          <a:prstGeom prst="rect">
+            <a:avLst/>
+          </a:prstGeom>
+          <a:noFill/>
+        </p:spPr>
+        <p:txBody>
+          <a:bodyPr wrap="none" rtlCol="0">
+            <a:spAutoFit/>
+          </a:bodyPr>
+          <a:lstStyle/>
+          <a:p>
+            <a:r>
+              <a:rPr lang="en-US" sz="2000" b="1" dirty="0"/>
+              <a:t>System View</a:t>
+            </a:r>
+            <a:endParaRPr lang="de-DE" sz="2000" dirty="0"/>
+          </a:p>
+        </p:txBody>
+      </p:sp>
+      <p:sp>
+        <p:nvSpPr>
+          <p:cNvPr id="173" name="Rectangle 172">
+            <a:extLst>
+              <a:ext uri="{FF2B5EF4-FFF2-40B4-BE49-F238E27FC236}">
+                <a16:creationId xmlns:a16="http://schemas.microsoft.com/office/drawing/2014/main" id="{9A32C01F-630D-467D-B285-6D2CB772ABB6}"/>
+              </a:ext>
+            </a:extLst>
+          </p:cNvPr>
+          <p:cNvSpPr/>
+          <p:nvPr/>
+        </p:nvSpPr>
+        <p:spPr>
+          <a:xfrm>
+            <a:off x="8345393" y="3747399"/>
+            <a:ext cx="472703" cy="229546"/>
           </a:xfrm>
           <a:prstGeom prst="rect">
             <a:avLst/>
@@ -8779,12 +9673,12 @@
           <a:p>
             <a:pPr algn="ctr"/>
             <a:r>
-              <a:rPr lang="en-US" sz="1050" dirty="0" err="1">
+              <a:rPr lang="en-US" sz="1050" dirty="0">
                 <a:solidFill>
                   <a:schemeClr val="tx1"/>
                 </a:solidFill>
               </a:rPr>
-              <a:t>mode.cfg</a:t>
+              <a:t>GPIO</a:t>
             </a:r>
             <a:endParaRPr lang="de-DE" sz="1050" dirty="0">
               <a:solidFill>
@@ -8796,10 +9690,10 @@
       </p:sp>
       <p:sp>
         <p:nvSpPr>
-          <p:cNvPr id="188" name="Rectangle 187">
-            <a:extLst>
-              <a:ext uri="{FF2B5EF4-FFF2-40B4-BE49-F238E27FC236}">
-                <a16:creationId xmlns:a16="http://schemas.microsoft.com/office/drawing/2014/main" id="{4DF7F199-BAF8-4D65-82D8-5C4D54A181CE}"/>
+          <p:cNvPr id="174" name="Rectangle 173">
+            <a:extLst>
+              <a:ext uri="{FF2B5EF4-FFF2-40B4-BE49-F238E27FC236}">
+                <a16:creationId xmlns:a16="http://schemas.microsoft.com/office/drawing/2014/main" id="{7F4A74E2-74BA-49BB-BC1A-EF2B9A940773}"/>
               </a:ext>
             </a:extLst>
           </p:cNvPr>
@@ -8808,8 +9702,8 @@
         </p:nvSpPr>
         <p:spPr>
           <a:xfrm>
-            <a:off x="8942861" y="5872012"/>
-            <a:ext cx="874341" cy="199536"/>
+            <a:off x="11298068" y="5130077"/>
+            <a:ext cx="472703" cy="229546"/>
           </a:xfrm>
           <a:prstGeom prst="rect">
             <a:avLst/>
@@ -8845,12 +9739,12 @@
           <a:p>
             <a:pPr algn="ctr"/>
             <a:r>
-              <a:rPr lang="en-US" sz="1050" dirty="0" err="1">
+              <a:rPr lang="en-US" sz="1050" dirty="0">
                 <a:solidFill>
                   <a:schemeClr val="tx1"/>
                 </a:solidFill>
               </a:rPr>
-              <a:t>timer.cfg</a:t>
+              <a:t>GPIO</a:t>
             </a:r>
             <a:endParaRPr lang="de-DE" sz="1050" dirty="0">
               <a:solidFill>
@@ -8862,10 +9756,69 @@
       </p:sp>
       <p:sp>
         <p:nvSpPr>
-          <p:cNvPr id="189" name="Rectangle 188">
-            <a:extLst>
-              <a:ext uri="{FF2B5EF4-FFF2-40B4-BE49-F238E27FC236}">
-                <a16:creationId xmlns:a16="http://schemas.microsoft.com/office/drawing/2014/main" id="{E8328257-015C-421A-B7D7-FC57C5FF5F6B}"/>
+          <p:cNvPr id="160" name="Half Frame 159">
+            <a:extLst>
+              <a:ext uri="{FF2B5EF4-FFF2-40B4-BE49-F238E27FC236}">
+                <a16:creationId xmlns:a16="http://schemas.microsoft.com/office/drawing/2014/main" id="{15B57045-DEB7-44F5-8AC4-4C9DD1420BD1}"/>
+              </a:ext>
+            </a:extLst>
+          </p:cNvPr>
+          <p:cNvSpPr/>
+          <p:nvPr/>
+        </p:nvSpPr>
+        <p:spPr>
+          <a:xfrm rot="10800000" flipH="1">
+            <a:off x="7249959" y="216615"/>
+            <a:ext cx="1150963" cy="2852657"/>
+          </a:xfrm>
+          <a:prstGeom prst="halfFrame">
+            <a:avLst>
+              <a:gd name="adj1" fmla="val 10161"/>
+              <a:gd name="adj2" fmla="val 9333"/>
+            </a:avLst>
+          </a:prstGeom>
+          <a:solidFill>
+            <a:schemeClr val="accent1">
+              <a:lumMod val="60000"/>
+              <a:lumOff val="40000"/>
+            </a:schemeClr>
+          </a:solidFill>
+        </p:spPr>
+        <p:style>
+          <a:lnRef idx="2">
+            <a:schemeClr val="accent1">
+              <a:shade val="50000"/>
+            </a:schemeClr>
+          </a:lnRef>
+          <a:fillRef idx="1">
+            <a:schemeClr val="accent1"/>
+          </a:fillRef>
+          <a:effectRef idx="0">
+            <a:schemeClr val="accent1"/>
+          </a:effectRef>
+          <a:fontRef idx="minor">
+            <a:schemeClr val="lt1"/>
+          </a:fontRef>
+        </p:style>
+        <p:txBody>
+          <a:bodyPr rtlCol="0" anchor="ctr"/>
+          <a:lstStyle/>
+          <a:p>
+            <a:pPr algn="ctr"/>
+            <a:endParaRPr lang="de-DE">
+              <a:solidFill>
+                <a:schemeClr val="tx1"/>
+              </a:solidFill>
+            </a:endParaRPr>
+          </a:p>
+        </p:txBody>
+      </p:sp>
+      <p:sp>
+        <p:nvSpPr>
+          <p:cNvPr id="20" name="Flowchart: Summing Junction 19">
+            <a:extLst>
+              <a:ext uri="{FF2B5EF4-FFF2-40B4-BE49-F238E27FC236}">
+                <a16:creationId xmlns:a16="http://schemas.microsoft.com/office/drawing/2014/main" id="{4ADF4D39-76C0-4A70-8377-2CE05DCB3075}"/>
               </a:ext>
             </a:extLst>
           </p:cNvPr>
@@ -8874,19 +9827,117 @@
         </p:nvSpPr>
         <p:spPr>
           <a:xfrm>
-            <a:off x="8940800" y="6109972"/>
-            <a:ext cx="874341" cy="199536"/>
+            <a:off x="8318883" y="2604294"/>
+            <a:ext cx="498875" cy="498875"/>
+          </a:xfrm>
+          <a:prstGeom prst="flowChartSummingJunction">
+            <a:avLst/>
+          </a:prstGeom>
+          <a:effectLst>
+            <a:outerShdw blurRad="50800" dist="38100" dir="2700000" algn="tl" rotWithShape="0">
+              <a:prstClr val="black">
+                <a:alpha val="40000"/>
+              </a:prstClr>
+            </a:outerShdw>
+          </a:effectLst>
+        </p:spPr>
+        <p:style>
+          <a:lnRef idx="2">
+            <a:schemeClr val="accent3">
+              <a:shade val="50000"/>
+            </a:schemeClr>
+          </a:lnRef>
+          <a:fillRef idx="1">
+            <a:schemeClr val="accent3"/>
+          </a:fillRef>
+          <a:effectRef idx="0">
+            <a:schemeClr val="accent3"/>
+          </a:effectRef>
+          <a:fontRef idx="minor">
+            <a:schemeClr val="lt1"/>
+          </a:fontRef>
+        </p:style>
+        <p:txBody>
+          <a:bodyPr rtlCol="0" anchor="ctr"/>
+          <a:lstStyle/>
+          <a:p>
+            <a:pPr algn="ctr"/>
+            <a:endParaRPr lang="de-DE"/>
+          </a:p>
+        </p:txBody>
+      </p:sp>
+      <p:cxnSp>
+        <p:nvCxnSpPr>
+          <p:cNvPr id="24" name="Straight Arrow Connector 23">
+            <a:extLst>
+              <a:ext uri="{FF2B5EF4-FFF2-40B4-BE49-F238E27FC236}">
+                <a16:creationId xmlns:a16="http://schemas.microsoft.com/office/drawing/2014/main" id="{076A55B3-C4EA-4B7C-B920-338279EE2419}"/>
+              </a:ext>
+            </a:extLst>
+          </p:cNvPr>
+          <p:cNvCxnSpPr>
+            <a:cxnSpLocks/>
+            <a:stCxn id="19" idx="2"/>
+          </p:cNvCxnSpPr>
+          <p:nvPr/>
+        </p:nvCxnSpPr>
+        <p:spPr>
+          <a:xfrm>
+            <a:off x="7965743" y="1418946"/>
+            <a:ext cx="552813" cy="1392764"/>
+          </a:xfrm>
+          <a:prstGeom prst="straightConnector1">
+            <a:avLst/>
+          </a:prstGeom>
+          <a:ln w="15875">
+            <a:solidFill>
+              <a:schemeClr val="tx1"/>
+            </a:solidFill>
+            <a:headEnd type="none"/>
+            <a:tailEnd type="oval"/>
+          </a:ln>
+        </p:spPr>
+        <p:style>
+          <a:lnRef idx="1">
+            <a:schemeClr val="accent1"/>
+          </a:lnRef>
+          <a:fillRef idx="0">
+            <a:schemeClr val="accent1"/>
+          </a:fillRef>
+          <a:effectRef idx="0">
+            <a:schemeClr val="accent1"/>
+          </a:effectRef>
+          <a:fontRef idx="minor">
+            <a:schemeClr val="tx1"/>
+          </a:fontRef>
+        </p:style>
+      </p:cxnSp>
+      <p:sp>
+        <p:nvSpPr>
+          <p:cNvPr id="176" name="Rectangle 175">
+            <a:extLst>
+              <a:ext uri="{FF2B5EF4-FFF2-40B4-BE49-F238E27FC236}">
+                <a16:creationId xmlns:a16="http://schemas.microsoft.com/office/drawing/2014/main" id="{6EB6342F-AB67-41F7-87AE-5611751B4474}"/>
+              </a:ext>
+            </a:extLst>
+          </p:cNvPr>
+          <p:cNvSpPr/>
+          <p:nvPr/>
+        </p:nvSpPr>
+        <p:spPr>
+          <a:xfrm>
+            <a:off x="7171998" y="116943"/>
+            <a:ext cx="4491028" cy="3058201"/>
           </a:xfrm>
           <a:prstGeom prst="rect">
             <a:avLst/>
           </a:prstGeom>
-          <a:solidFill>
-            <a:schemeClr val="bg2"/>
-          </a:solidFill>
-          <a:ln>
+          <a:noFill/>
+          <a:ln w="19050">
             <a:solidFill>
               <a:schemeClr val="tx1"/>
             </a:solidFill>
+            <a:prstDash val="dash"/>
           </a:ln>
         </p:spPr>
         <p:style>
@@ -8910,167 +9961,11 @@
           <a:lstStyle/>
           <a:p>
             <a:pPr algn="ctr"/>
-            <a:r>
-              <a:rPr lang="en-US" sz="1050" dirty="0" err="1">
-                <a:solidFill>
-                  <a:schemeClr val="tx1"/>
-                </a:solidFill>
-              </a:rPr>
-              <a:t>manual.cfg</a:t>
-            </a:r>
-            <a:endParaRPr lang="de-DE" sz="1050" dirty="0">
+            <a:endParaRPr lang="de-DE" sz="2400" b="1" dirty="0">
               <a:solidFill>
                 <a:schemeClr val="tx1"/>
               </a:solidFill>
             </a:endParaRPr>
-          </a:p>
-        </p:txBody>
-      </p:sp>
-      <p:cxnSp>
-        <p:nvCxnSpPr>
-          <p:cNvPr id="194" name="Straight Connector 193">
-            <a:extLst>
-              <a:ext uri="{FF2B5EF4-FFF2-40B4-BE49-F238E27FC236}">
-                <a16:creationId xmlns:a16="http://schemas.microsoft.com/office/drawing/2014/main" id="{60BAF92D-D08F-4725-ACF8-71C566A183F4}"/>
-              </a:ext>
-            </a:extLst>
-          </p:cNvPr>
-          <p:cNvCxnSpPr>
-            <a:cxnSpLocks/>
-            <a:stCxn id="107" idx="2"/>
-          </p:cNvCxnSpPr>
-          <p:nvPr/>
-        </p:nvCxnSpPr>
-        <p:spPr>
-          <a:xfrm>
-            <a:off x="6577134" y="3682178"/>
-            <a:ext cx="0" cy="233775"/>
-          </a:xfrm>
-          <a:prstGeom prst="line">
-            <a:avLst/>
-          </a:prstGeom>
-          <a:ln w="15875"/>
-        </p:spPr>
-        <p:style>
-          <a:lnRef idx="1">
-            <a:schemeClr val="dk1"/>
-          </a:lnRef>
-          <a:fillRef idx="0">
-            <a:schemeClr val="dk1"/>
-          </a:fillRef>
-          <a:effectRef idx="0">
-            <a:schemeClr val="dk1"/>
-          </a:effectRef>
-          <a:fontRef idx="minor">
-            <a:schemeClr val="tx1"/>
-          </a:fontRef>
-        </p:style>
-      </p:cxnSp>
-      <p:sp>
-        <p:nvSpPr>
-          <p:cNvPr id="198" name="TextBox 197">
-            <a:extLst>
-              <a:ext uri="{FF2B5EF4-FFF2-40B4-BE49-F238E27FC236}">
-                <a16:creationId xmlns:a16="http://schemas.microsoft.com/office/drawing/2014/main" id="{6333412B-CF20-4656-8302-DB37BC5F5D69}"/>
-              </a:ext>
-            </a:extLst>
-          </p:cNvPr>
-          <p:cNvSpPr txBox="1"/>
-          <p:nvPr/>
-        </p:nvSpPr>
-        <p:spPr>
-          <a:xfrm>
-            <a:off x="8290881" y="5487636"/>
-            <a:ext cx="558166" cy="338554"/>
-          </a:xfrm>
-          <a:prstGeom prst="rect">
-            <a:avLst/>
-          </a:prstGeom>
-          <a:noFill/>
-        </p:spPr>
-        <p:txBody>
-          <a:bodyPr wrap="none" rtlCol="0">
-            <a:spAutoFit/>
-          </a:bodyPr>
-          <a:lstStyle/>
-          <a:p>
-            <a:r>
-              <a:rPr lang="en-US" sz="1600" dirty="0"/>
-              <a:t>R/W</a:t>
-            </a:r>
-            <a:endParaRPr lang="de-DE" sz="1600" dirty="0"/>
-          </a:p>
-        </p:txBody>
-      </p:sp>
-      <p:sp>
-        <p:nvSpPr>
-          <p:cNvPr id="199" name="TextBox 198">
-            <a:extLst>
-              <a:ext uri="{FF2B5EF4-FFF2-40B4-BE49-F238E27FC236}">
-                <a16:creationId xmlns:a16="http://schemas.microsoft.com/office/drawing/2014/main" id="{03DCF01F-8CFE-4515-9DB9-48551D76D6F3}"/>
-              </a:ext>
-            </a:extLst>
-          </p:cNvPr>
-          <p:cNvSpPr txBox="1"/>
-          <p:nvPr/>
-        </p:nvSpPr>
-        <p:spPr>
-          <a:xfrm rot="18830730">
-            <a:off x="9223058" y="4651485"/>
-            <a:ext cx="558166" cy="338554"/>
-          </a:xfrm>
-          <a:prstGeom prst="rect">
-            <a:avLst/>
-          </a:prstGeom>
-          <a:noFill/>
-        </p:spPr>
-        <p:txBody>
-          <a:bodyPr wrap="none" rtlCol="0">
-            <a:spAutoFit/>
-          </a:bodyPr>
-          <a:lstStyle/>
-          <a:p>
-            <a:r>
-              <a:rPr lang="en-US" sz="1600" dirty="0"/>
-              <a:t>R/W</a:t>
-            </a:r>
-            <a:endParaRPr lang="de-DE" sz="1600" dirty="0"/>
-          </a:p>
-        </p:txBody>
-      </p:sp>
-      <p:sp>
-        <p:nvSpPr>
-          <p:cNvPr id="200" name="TextBox 199">
-            <a:extLst>
-              <a:ext uri="{FF2B5EF4-FFF2-40B4-BE49-F238E27FC236}">
-                <a16:creationId xmlns:a16="http://schemas.microsoft.com/office/drawing/2014/main" id="{BF106B45-3653-4010-A620-60DA9D403ED9}"/>
-              </a:ext>
-            </a:extLst>
-          </p:cNvPr>
-          <p:cNvSpPr txBox="1"/>
-          <p:nvPr/>
-        </p:nvSpPr>
-        <p:spPr>
-          <a:xfrm>
-            <a:off x="2407615" y="3959238"/>
-            <a:ext cx="768159" cy="338554"/>
-          </a:xfrm>
-          <a:prstGeom prst="rect">
-            <a:avLst/>
-          </a:prstGeom>
-          <a:noFill/>
-        </p:spPr>
-        <p:txBody>
-          <a:bodyPr wrap="none" rtlCol="0">
-            <a:spAutoFit/>
-          </a:bodyPr>
-          <a:lstStyle/>
-          <a:p>
-            <a:r>
-              <a:rPr lang="en-US" sz="1600" dirty="0"/>
-              <a:t>(+VPN)</a:t>
-            </a:r>
-            <a:endParaRPr lang="de-DE" sz="1600" dirty="0"/>
           </a:p>
         </p:txBody>
       </p:sp>

</xml_diff>

<commit_message>
Updated documentation: System Diagram 1 minor additions
</commit_message>
<xml_diff>
--- a/documentation/SystemView-1_HighLevel.pptx
+++ b/documentation/SystemView-1_HighLevel.pptx
@@ -9779,10 +9779,15 @@
           </a:prstGeom>
           <a:solidFill>
             <a:schemeClr val="accent1">
-              <a:lumMod val="60000"/>
-              <a:lumOff val="40000"/>
+              <a:lumMod val="20000"/>
+              <a:lumOff val="80000"/>
             </a:schemeClr>
           </a:solidFill>
+          <a:ln>
+            <a:solidFill>
+              <a:schemeClr val="tx1"/>
+            </a:solidFill>
+          </a:ln>
         </p:spPr>
         <p:style>
           <a:lnRef idx="2">
@@ -9969,6 +9974,88 @@
           </a:p>
         </p:txBody>
       </p:sp>
+      <p:sp>
+        <p:nvSpPr>
+          <p:cNvPr id="93" name="TextBox 92">
+            <a:extLst>
+              <a:ext uri="{FF2B5EF4-FFF2-40B4-BE49-F238E27FC236}">
+                <a16:creationId xmlns:a16="http://schemas.microsoft.com/office/drawing/2014/main" id="{1FC357EF-517E-48DA-BF93-E4E919C87F17}"/>
+              </a:ext>
+            </a:extLst>
+          </p:cNvPr>
+          <p:cNvSpPr txBox="1"/>
+          <p:nvPr/>
+        </p:nvSpPr>
+        <p:spPr>
+          <a:xfrm>
+            <a:off x="6342917" y="1591333"/>
+            <a:ext cx="588751" cy="338554"/>
+          </a:xfrm>
+          <a:prstGeom prst="rect">
+            <a:avLst/>
+          </a:prstGeom>
+          <a:noFill/>
+        </p:spPr>
+        <p:txBody>
+          <a:bodyPr wrap="none" rtlCol="0">
+            <a:spAutoFit/>
+          </a:bodyPr>
+          <a:lstStyle/>
+          <a:p>
+            <a:r>
+              <a:rPr lang="en-US" sz="1600" dirty="0"/>
+              <a:t>Tube</a:t>
+            </a:r>
+            <a:endParaRPr lang="de-DE" sz="1600" dirty="0"/>
+          </a:p>
+        </p:txBody>
+      </p:sp>
+      <p:cxnSp>
+        <p:nvCxnSpPr>
+          <p:cNvPr id="94" name="Straight Arrow Connector 93">
+            <a:extLst>
+              <a:ext uri="{FF2B5EF4-FFF2-40B4-BE49-F238E27FC236}">
+                <a16:creationId xmlns:a16="http://schemas.microsoft.com/office/drawing/2014/main" id="{7F77BB33-013C-4A91-9726-180FFDCFC5B0}"/>
+              </a:ext>
+            </a:extLst>
+          </p:cNvPr>
+          <p:cNvCxnSpPr>
+            <a:cxnSpLocks/>
+            <a:stCxn id="93" idx="3"/>
+          </p:cNvCxnSpPr>
+          <p:nvPr/>
+        </p:nvCxnSpPr>
+        <p:spPr>
+          <a:xfrm flipV="1">
+            <a:off x="6931668" y="1469852"/>
+            <a:ext cx="381978" cy="290758"/>
+          </a:xfrm>
+          <a:prstGeom prst="straightConnector1">
+            <a:avLst/>
+          </a:prstGeom>
+          <a:ln w="15875">
+            <a:solidFill>
+              <a:schemeClr val="tx1"/>
+            </a:solidFill>
+            <a:headEnd type="none"/>
+            <a:tailEnd type="oval"/>
+          </a:ln>
+        </p:spPr>
+        <p:style>
+          <a:lnRef idx="1">
+            <a:schemeClr val="accent1"/>
+          </a:lnRef>
+          <a:fillRef idx="0">
+            <a:schemeClr val="accent1"/>
+          </a:fillRef>
+          <a:effectRef idx="0">
+            <a:schemeClr val="accent1"/>
+          </a:effectRef>
+          <a:fontRef idx="minor">
+            <a:schemeClr val="tx1"/>
+          </a:fontRef>
+        </p:style>
+      </p:cxnSp>
     </p:spTree>
     <p:extLst>
       <p:ext uri="{BB962C8B-B14F-4D97-AF65-F5344CB8AC3E}">

</xml_diff>